<commit_message>
Separate problem from solution
</commit_message>
<xml_diff>
--- a/2023/2023-03/2023-03-29/problem.pptx
+++ b/2023/2023-03/2023-03-29/problem.pptx
@@ -6,9 +6,7 @@
   </p:sldMasterIdLst>
   <p:sldIdLst>
     <p:sldId id="256" r:id="rId2"/>
-    <p:sldId id="266" r:id="rId3"/>
-    <p:sldId id="259" r:id="rId4"/>
-    <p:sldId id="262" r:id="rId5"/>
+    <p:sldId id="267" r:id="rId3"/>
   </p:sldIdLst>
   <p:sldSz cx="12192000" cy="6858000"/>
   <p:notesSz cx="6858000" cy="9144000"/>
@@ -457,7 +455,7 @@
           <a:p>
             <a:fld id="{13CAB402-B863-4AA4-B7CA-C5BADD25EDE0}" type="datetimeFigureOut">
               <a:rPr lang="en-US" smtClean="0"/>
-              <a:t>3/29/2023</a:t>
+              <a:t>3/30/2023</a:t>
             </a:fld>
             <a:endParaRPr lang="en-US"/>
           </a:p>
@@ -781,7 +779,7 @@
           <a:p>
             <a:fld id="{13CAB402-B863-4AA4-B7CA-C5BADD25EDE0}" type="datetimeFigureOut">
               <a:rPr lang="en-US" smtClean="0"/>
-              <a:t>3/29/2023</a:t>
+              <a:t>3/30/2023</a:t>
             </a:fld>
             <a:endParaRPr lang="en-US"/>
           </a:p>
@@ -1029,7 +1027,7 @@
           <a:p>
             <a:fld id="{13CAB402-B863-4AA4-B7CA-C5BADD25EDE0}" type="datetimeFigureOut">
               <a:rPr lang="en-US" smtClean="0"/>
-              <a:t>3/29/2023</a:t>
+              <a:t>3/30/2023</a:t>
             </a:fld>
             <a:endParaRPr lang="en-US"/>
           </a:p>
@@ -1368,7 +1366,7 @@
           <a:p>
             <a:fld id="{13CAB402-B863-4AA4-B7CA-C5BADD25EDE0}" type="datetimeFigureOut">
               <a:rPr lang="en-US" smtClean="0"/>
-              <a:t>3/29/2023</a:t>
+              <a:t>3/30/2023</a:t>
             </a:fld>
             <a:endParaRPr lang="en-US"/>
           </a:p>
@@ -1715,7 +1713,7 @@
           <a:p>
             <a:fld id="{13CAB402-B863-4AA4-B7CA-C5BADD25EDE0}" type="datetimeFigureOut">
               <a:rPr lang="en-US" smtClean="0"/>
-              <a:t>3/29/2023</a:t>
+              <a:t>3/30/2023</a:t>
             </a:fld>
             <a:endParaRPr lang="en-US"/>
           </a:p>
@@ -2089,7 +2087,7 @@
           <a:p>
             <a:fld id="{13CAB402-B863-4AA4-B7CA-C5BADD25EDE0}" type="datetimeFigureOut">
               <a:rPr lang="en-US" smtClean="0"/>
-              <a:t>3/29/2023</a:t>
+              <a:t>3/30/2023</a:t>
             </a:fld>
             <a:endParaRPr lang="en-US"/>
           </a:p>
@@ -2559,7 +2557,7 @@
           <a:p>
             <a:fld id="{13CAB402-B863-4AA4-B7CA-C5BADD25EDE0}" type="datetimeFigureOut">
               <a:rPr lang="en-US" smtClean="0"/>
-              <a:t>3/29/2023</a:t>
+              <a:t>3/30/2023</a:t>
             </a:fld>
             <a:endParaRPr lang="en-US"/>
           </a:p>
@@ -2764,7 +2762,7 @@
           <a:p>
             <a:fld id="{13CAB402-B863-4AA4-B7CA-C5BADD25EDE0}" type="datetimeFigureOut">
               <a:rPr lang="en-US" smtClean="0"/>
-              <a:t>3/29/2023</a:t>
+              <a:t>3/30/2023</a:t>
             </a:fld>
             <a:endParaRPr lang="en-US"/>
           </a:p>
@@ -2975,7 +2973,7 @@
           <a:p>
             <a:fld id="{13CAB402-B863-4AA4-B7CA-C5BADD25EDE0}" type="datetimeFigureOut">
               <a:rPr lang="en-US" smtClean="0"/>
-              <a:t>3/29/2023</a:t>
+              <a:t>3/30/2023</a:t>
             </a:fld>
             <a:endParaRPr lang="en-US"/>
           </a:p>
@@ -3207,7 +3205,7 @@
           <a:p>
             <a:fld id="{13CAB402-B863-4AA4-B7CA-C5BADD25EDE0}" type="datetimeFigureOut">
               <a:rPr lang="en-US" smtClean="0"/>
-              <a:t>3/29/2023</a:t>
+              <a:t>3/30/2023</a:t>
             </a:fld>
             <a:endParaRPr lang="en-US"/>
           </a:p>
@@ -3455,7 +3453,7 @@
           <a:p>
             <a:fld id="{13CAB402-B863-4AA4-B7CA-C5BADD25EDE0}" type="datetimeFigureOut">
               <a:rPr lang="en-US" smtClean="0"/>
-              <a:t>3/29/2023</a:t>
+              <a:t>3/30/2023</a:t>
             </a:fld>
             <a:endParaRPr lang="en-US"/>
           </a:p>
@@ -3753,7 +3751,7 @@
           <a:p>
             <a:fld id="{13CAB402-B863-4AA4-B7CA-C5BADD25EDE0}" type="datetimeFigureOut">
               <a:rPr lang="en-US" smtClean="0"/>
-              <a:t>3/29/2023</a:t>
+              <a:t>3/30/2023</a:t>
             </a:fld>
             <a:endParaRPr lang="en-US"/>
           </a:p>
@@ -4147,7 +4145,7 @@
           <a:p>
             <a:fld id="{13CAB402-B863-4AA4-B7CA-C5BADD25EDE0}" type="datetimeFigureOut">
               <a:rPr lang="en-US" smtClean="0"/>
-              <a:t>3/29/2023</a:t>
+              <a:t>3/30/2023</a:t>
             </a:fld>
             <a:endParaRPr lang="en-US"/>
           </a:p>
@@ -4296,7 +4294,7 @@
           <a:p>
             <a:fld id="{13CAB402-B863-4AA4-B7CA-C5BADD25EDE0}" type="datetimeFigureOut">
               <a:rPr lang="en-US" smtClean="0"/>
-              <a:t>3/29/2023</a:t>
+              <a:t>3/30/2023</a:t>
             </a:fld>
             <a:endParaRPr lang="en-US"/>
           </a:p>
@@ -4422,7 +4420,7 @@
           <a:p>
             <a:fld id="{13CAB402-B863-4AA4-B7CA-C5BADD25EDE0}" type="datetimeFigureOut">
               <a:rPr lang="en-US" smtClean="0"/>
-              <a:t>3/29/2023</a:t>
+              <a:t>3/30/2023</a:t>
             </a:fld>
             <a:endParaRPr lang="en-US"/>
           </a:p>
@@ -4677,7 +4675,7 @@
           <a:p>
             <a:fld id="{13CAB402-B863-4AA4-B7CA-C5BADD25EDE0}" type="datetimeFigureOut">
               <a:rPr lang="en-US" smtClean="0"/>
-              <a:t>3/29/2023</a:t>
+              <a:t>3/30/2023</a:t>
             </a:fld>
             <a:endParaRPr lang="en-US"/>
           </a:p>
@@ -4992,7 +4990,7 @@
           <a:p>
             <a:fld id="{13CAB402-B863-4AA4-B7CA-C5BADD25EDE0}" type="datetimeFigureOut">
               <a:rPr lang="en-US" smtClean="0"/>
-              <a:t>3/29/2023</a:t>
+              <a:t>3/30/2023</a:t>
             </a:fld>
             <a:endParaRPr lang="en-US"/>
           </a:p>
@@ -5343,7 +5341,7 @@
           <a:p>
             <a:fld id="{13CAB402-B863-4AA4-B7CA-C5BADD25EDE0}" type="datetimeFigureOut">
               <a:rPr lang="en-US" smtClean="0"/>
-              <a:t>3/29/2023</a:t>
+              <a:t>3/30/2023</a:t>
             </a:fld>
             <a:endParaRPr lang="en-US"/>
           </a:p>
@@ -5971,10 +5969,10 @@
       </p:grpSpPr>
       <p:sp>
         <p:nvSpPr>
-          <p:cNvPr id="5" name="Title 4">
+          <p:cNvPr id="2" name="Title 1">
             <a:extLst>
               <a:ext uri="{FF2B5EF4-FFF2-40B4-BE49-F238E27FC236}">
-                <a16:creationId xmlns:a16="http://schemas.microsoft.com/office/drawing/2014/main" id="{0BDBD692-13DC-C5F7-E6E6-ACCB15492C64}"/>
+                <a16:creationId xmlns:a16="http://schemas.microsoft.com/office/drawing/2014/main" id="{10B87E44-A58B-21BF-65AC-BE6021CF73B4}"/>
               </a:ext>
             </a:extLst>
           </p:cNvPr>
@@ -5987,9 +5985,35 @@
         </p:nvSpPr>
         <p:spPr/>
         <p:txBody>
-          <a:bodyPr>
-            <a:normAutofit fontScale="90000"/>
-          </a:bodyPr>
+          <a:bodyPr/>
+          <a:lstStyle/>
+          <a:p>
+            <a:r>
+              <a:rPr lang="en-US" dirty="0"/>
+              <a:t>Problem</a:t>
+            </a:r>
+          </a:p>
+        </p:txBody>
+      </p:sp>
+      <p:sp>
+        <p:nvSpPr>
+          <p:cNvPr id="3" name="Content Placeholder 2">
+            <a:extLst>
+              <a:ext uri="{FF2B5EF4-FFF2-40B4-BE49-F238E27FC236}">
+                <a16:creationId xmlns:a16="http://schemas.microsoft.com/office/drawing/2014/main" id="{52B54DDF-B314-8FBD-E539-07EF31D59BD2}"/>
+              </a:ext>
+            </a:extLst>
+          </p:cNvPr>
+          <p:cNvSpPr>
+            <a:spLocks noGrp="1"/>
+          </p:cNvSpPr>
+          <p:nvPr>
+            <p:ph idx="1"/>
+          </p:nvPr>
+        </p:nvSpPr>
+        <p:spPr/>
+        <p:txBody>
+          <a:bodyPr/>
           <a:lstStyle/>
           <a:p>
             <a:r>
@@ -6001,10 +6025,10 @@
       </p:sp>
       <p:grpSp>
         <p:nvGrpSpPr>
-          <p:cNvPr id="23" name="Group 22">
+          <p:cNvPr id="4" name="Group 3">
             <a:extLst>
               <a:ext uri="{FF2B5EF4-FFF2-40B4-BE49-F238E27FC236}">
-                <a16:creationId xmlns:a16="http://schemas.microsoft.com/office/drawing/2014/main" id="{6B8864D0-11E7-8F0D-02A5-80C2F91D8FD8}"/>
+                <a16:creationId xmlns:a16="http://schemas.microsoft.com/office/drawing/2014/main" id="{56290C68-E722-9A66-1F90-16903562541D}"/>
               </a:ext>
             </a:extLst>
           </p:cNvPr>
@@ -6013,1282 +6037,7 @@
         </p:nvGrpSpPr>
         <p:grpSpPr>
           <a:xfrm>
-            <a:off x="4264548" y="2508149"/>
-            <a:ext cx="1831452" cy="1841702"/>
-            <a:chOff x="4265249" y="3426619"/>
-            <a:chExt cx="1831452" cy="1841702"/>
-          </a:xfrm>
-        </p:grpSpPr>
-        <p:sp>
-          <p:nvSpPr>
-            <p:cNvPr id="9" name="Freeform: Shape 8">
-              <a:extLst>
-                <a:ext uri="{FF2B5EF4-FFF2-40B4-BE49-F238E27FC236}">
-                  <a16:creationId xmlns:a16="http://schemas.microsoft.com/office/drawing/2014/main" id="{6CB93148-1370-8FBF-CC95-596343333DD1}"/>
-                </a:ext>
-              </a:extLst>
-            </p:cNvPr>
-            <p:cNvSpPr/>
-            <p:nvPr/>
-          </p:nvSpPr>
-          <p:spPr>
-            <a:xfrm>
-              <a:off x="4265249" y="3426619"/>
-              <a:ext cx="1827702" cy="1841702"/>
-            </a:xfrm>
-            <a:custGeom>
-              <a:avLst/>
-              <a:gdLst>
-                <a:gd name="connsiteX0" fmla="*/ 0 w 2113472"/>
-                <a:gd name="connsiteY0" fmla="*/ 914400 h 1794294"/>
-                <a:gd name="connsiteX1" fmla="*/ 957532 w 2113472"/>
-                <a:gd name="connsiteY1" fmla="*/ 914400 h 1794294"/>
-                <a:gd name="connsiteX2" fmla="*/ 957532 w 2113472"/>
-                <a:gd name="connsiteY2" fmla="*/ 0 h 1794294"/>
-                <a:gd name="connsiteX3" fmla="*/ 2113472 w 2113472"/>
-                <a:gd name="connsiteY3" fmla="*/ 0 h 1794294"/>
-                <a:gd name="connsiteX4" fmla="*/ 2113472 w 2113472"/>
-                <a:gd name="connsiteY4" fmla="*/ 1794294 h 1794294"/>
-                <a:gd name="connsiteX5" fmla="*/ 120770 w 2113472"/>
-                <a:gd name="connsiteY5" fmla="*/ 1794294 h 1794294"/>
-                <a:gd name="connsiteX6" fmla="*/ 0 w 2113472"/>
-                <a:gd name="connsiteY6" fmla="*/ 914400 h 1794294"/>
-                <a:gd name="connsiteX0" fmla="*/ 25280 w 2138752"/>
-                <a:gd name="connsiteY0" fmla="*/ 914400 h 1797469"/>
-                <a:gd name="connsiteX1" fmla="*/ 982812 w 2138752"/>
-                <a:gd name="connsiteY1" fmla="*/ 914400 h 1797469"/>
-                <a:gd name="connsiteX2" fmla="*/ 982812 w 2138752"/>
-                <a:gd name="connsiteY2" fmla="*/ 0 h 1797469"/>
-                <a:gd name="connsiteX3" fmla="*/ 2138752 w 2138752"/>
-                <a:gd name="connsiteY3" fmla="*/ 0 h 1797469"/>
-                <a:gd name="connsiteX4" fmla="*/ 2138752 w 2138752"/>
-                <a:gd name="connsiteY4" fmla="*/ 1794294 h 1797469"/>
-                <a:gd name="connsiteX5" fmla="*/ 0 w 2138752"/>
-                <a:gd name="connsiteY5" fmla="*/ 1797469 h 1797469"/>
-                <a:gd name="connsiteX6" fmla="*/ 25280 w 2138752"/>
-                <a:gd name="connsiteY6" fmla="*/ 914400 h 1797469"/>
-                <a:gd name="connsiteX0" fmla="*/ 25280 w 3422607"/>
-                <a:gd name="connsiteY0" fmla="*/ 914400 h 2468549"/>
-                <a:gd name="connsiteX1" fmla="*/ 982812 w 3422607"/>
-                <a:gd name="connsiteY1" fmla="*/ 914400 h 2468549"/>
-                <a:gd name="connsiteX2" fmla="*/ 982812 w 3422607"/>
-                <a:gd name="connsiteY2" fmla="*/ 0 h 2468549"/>
-                <a:gd name="connsiteX3" fmla="*/ 2138752 w 3422607"/>
-                <a:gd name="connsiteY3" fmla="*/ 0 h 2468549"/>
-                <a:gd name="connsiteX4" fmla="*/ 3422607 w 3422607"/>
-                <a:gd name="connsiteY4" fmla="*/ 2468549 h 2468549"/>
-                <a:gd name="connsiteX5" fmla="*/ 0 w 3422607"/>
-                <a:gd name="connsiteY5" fmla="*/ 1797469 h 2468549"/>
-                <a:gd name="connsiteX6" fmla="*/ 25280 w 3422607"/>
-                <a:gd name="connsiteY6" fmla="*/ 914400 h 2468549"/>
-                <a:gd name="connsiteX0" fmla="*/ 25280 w 3422607"/>
-                <a:gd name="connsiteY0" fmla="*/ 914400 h 2468549"/>
-                <a:gd name="connsiteX1" fmla="*/ 982812 w 3422607"/>
-                <a:gd name="connsiteY1" fmla="*/ 914400 h 2468549"/>
-                <a:gd name="connsiteX2" fmla="*/ 982812 w 3422607"/>
-                <a:gd name="connsiteY2" fmla="*/ 0 h 2468549"/>
-                <a:gd name="connsiteX3" fmla="*/ 2138752 w 3422607"/>
-                <a:gd name="connsiteY3" fmla="*/ 0 h 2468549"/>
-                <a:gd name="connsiteX4" fmla="*/ 3422607 w 3422607"/>
-                <a:gd name="connsiteY4" fmla="*/ 2468549 h 2468549"/>
-                <a:gd name="connsiteX5" fmla="*/ 0 w 3422607"/>
-                <a:gd name="connsiteY5" fmla="*/ 2407069 h 2468549"/>
-                <a:gd name="connsiteX6" fmla="*/ 25280 w 3422607"/>
-                <a:gd name="connsiteY6" fmla="*/ 914400 h 2468549"/>
-                <a:gd name="connsiteX0" fmla="*/ 25280 w 3431843"/>
-                <a:gd name="connsiteY0" fmla="*/ 914400 h 2468549"/>
-                <a:gd name="connsiteX1" fmla="*/ 982812 w 3431843"/>
-                <a:gd name="connsiteY1" fmla="*/ 914400 h 2468549"/>
-                <a:gd name="connsiteX2" fmla="*/ 982812 w 3431843"/>
-                <a:gd name="connsiteY2" fmla="*/ 0 h 2468549"/>
-                <a:gd name="connsiteX3" fmla="*/ 3431843 w 3431843"/>
-                <a:gd name="connsiteY3" fmla="*/ 0 h 2468549"/>
-                <a:gd name="connsiteX4" fmla="*/ 3422607 w 3431843"/>
-                <a:gd name="connsiteY4" fmla="*/ 2468549 h 2468549"/>
-                <a:gd name="connsiteX5" fmla="*/ 0 w 3431843"/>
-                <a:gd name="connsiteY5" fmla="*/ 2407069 h 2468549"/>
-                <a:gd name="connsiteX6" fmla="*/ 25280 w 3431843"/>
-                <a:gd name="connsiteY6" fmla="*/ 914400 h 2468549"/>
-                <a:gd name="connsiteX0" fmla="*/ 25280 w 3431843"/>
-                <a:gd name="connsiteY0" fmla="*/ 914400 h 2468549"/>
-                <a:gd name="connsiteX1" fmla="*/ 1860266 w 3431843"/>
-                <a:gd name="connsiteY1" fmla="*/ 1320800 h 2468549"/>
-                <a:gd name="connsiteX2" fmla="*/ 982812 w 3431843"/>
-                <a:gd name="connsiteY2" fmla="*/ 0 h 2468549"/>
-                <a:gd name="connsiteX3" fmla="*/ 3431843 w 3431843"/>
-                <a:gd name="connsiteY3" fmla="*/ 0 h 2468549"/>
-                <a:gd name="connsiteX4" fmla="*/ 3422607 w 3431843"/>
-                <a:gd name="connsiteY4" fmla="*/ 2468549 h 2468549"/>
-                <a:gd name="connsiteX5" fmla="*/ 0 w 3431843"/>
-                <a:gd name="connsiteY5" fmla="*/ 2407069 h 2468549"/>
-                <a:gd name="connsiteX6" fmla="*/ 25280 w 3431843"/>
-                <a:gd name="connsiteY6" fmla="*/ 914400 h 2468549"/>
-                <a:gd name="connsiteX0" fmla="*/ 25280 w 3431843"/>
-                <a:gd name="connsiteY0" fmla="*/ 914400 h 2468549"/>
-                <a:gd name="connsiteX1" fmla="*/ 1860266 w 3431843"/>
-                <a:gd name="connsiteY1" fmla="*/ 1320800 h 2468549"/>
-                <a:gd name="connsiteX2" fmla="*/ 1869503 w 3431843"/>
-                <a:gd name="connsiteY2" fmla="*/ 18473 h 2468549"/>
-                <a:gd name="connsiteX3" fmla="*/ 3431843 w 3431843"/>
-                <a:gd name="connsiteY3" fmla="*/ 0 h 2468549"/>
-                <a:gd name="connsiteX4" fmla="*/ 3422607 w 3431843"/>
-                <a:gd name="connsiteY4" fmla="*/ 2468549 h 2468549"/>
-                <a:gd name="connsiteX5" fmla="*/ 0 w 3431843"/>
-                <a:gd name="connsiteY5" fmla="*/ 2407069 h 2468549"/>
-                <a:gd name="connsiteX6" fmla="*/ 25280 w 3431843"/>
-                <a:gd name="connsiteY6" fmla="*/ 914400 h 2468549"/>
-                <a:gd name="connsiteX0" fmla="*/ 25280 w 3431843"/>
-                <a:gd name="connsiteY0" fmla="*/ 1256145 h 2468549"/>
-                <a:gd name="connsiteX1" fmla="*/ 1860266 w 3431843"/>
-                <a:gd name="connsiteY1" fmla="*/ 1320800 h 2468549"/>
-                <a:gd name="connsiteX2" fmla="*/ 1869503 w 3431843"/>
-                <a:gd name="connsiteY2" fmla="*/ 18473 h 2468549"/>
-                <a:gd name="connsiteX3" fmla="*/ 3431843 w 3431843"/>
-                <a:gd name="connsiteY3" fmla="*/ 0 h 2468549"/>
-                <a:gd name="connsiteX4" fmla="*/ 3422607 w 3431843"/>
-                <a:gd name="connsiteY4" fmla="*/ 2468549 h 2468549"/>
-                <a:gd name="connsiteX5" fmla="*/ 0 w 3431843"/>
-                <a:gd name="connsiteY5" fmla="*/ 2407069 h 2468549"/>
-                <a:gd name="connsiteX6" fmla="*/ 25280 w 3431843"/>
-                <a:gd name="connsiteY6" fmla="*/ 1256145 h 2468549"/>
-                <a:gd name="connsiteX0" fmla="*/ 52989 w 3431843"/>
-                <a:gd name="connsiteY0" fmla="*/ 1311563 h 2468549"/>
-                <a:gd name="connsiteX1" fmla="*/ 1860266 w 3431843"/>
-                <a:gd name="connsiteY1" fmla="*/ 1320800 h 2468549"/>
-                <a:gd name="connsiteX2" fmla="*/ 1869503 w 3431843"/>
-                <a:gd name="connsiteY2" fmla="*/ 18473 h 2468549"/>
-                <a:gd name="connsiteX3" fmla="*/ 3431843 w 3431843"/>
-                <a:gd name="connsiteY3" fmla="*/ 0 h 2468549"/>
-                <a:gd name="connsiteX4" fmla="*/ 3422607 w 3431843"/>
-                <a:gd name="connsiteY4" fmla="*/ 2468549 h 2468549"/>
-                <a:gd name="connsiteX5" fmla="*/ 0 w 3431843"/>
-                <a:gd name="connsiteY5" fmla="*/ 2407069 h 2468549"/>
-                <a:gd name="connsiteX6" fmla="*/ 52989 w 3431843"/>
-                <a:gd name="connsiteY6" fmla="*/ 1311563 h 2468549"/>
-                <a:gd name="connsiteX0" fmla="*/ 52989 w 3432731"/>
-                <a:gd name="connsiteY0" fmla="*/ 1311563 h 2407069"/>
-                <a:gd name="connsiteX1" fmla="*/ 1860266 w 3432731"/>
-                <a:gd name="connsiteY1" fmla="*/ 1320800 h 2407069"/>
-                <a:gd name="connsiteX2" fmla="*/ 1869503 w 3432731"/>
-                <a:gd name="connsiteY2" fmla="*/ 18473 h 2407069"/>
-                <a:gd name="connsiteX3" fmla="*/ 3431843 w 3432731"/>
-                <a:gd name="connsiteY3" fmla="*/ 0 h 2407069"/>
-                <a:gd name="connsiteX4" fmla="*/ 3431843 w 3432731"/>
-                <a:gd name="connsiteY4" fmla="*/ 2394658 h 2407069"/>
-                <a:gd name="connsiteX5" fmla="*/ 0 w 3432731"/>
-                <a:gd name="connsiteY5" fmla="*/ 2407069 h 2407069"/>
-                <a:gd name="connsiteX6" fmla="*/ 52989 w 3432731"/>
-                <a:gd name="connsiteY6" fmla="*/ 1311563 h 2407069"/>
-                <a:gd name="connsiteX0" fmla="*/ 52989 w 3432731"/>
-                <a:gd name="connsiteY0" fmla="*/ 1311563 h 2407069"/>
-                <a:gd name="connsiteX1" fmla="*/ 2109647 w 3432731"/>
-                <a:gd name="connsiteY1" fmla="*/ 1440872 h 2407069"/>
-                <a:gd name="connsiteX2" fmla="*/ 1869503 w 3432731"/>
-                <a:gd name="connsiteY2" fmla="*/ 18473 h 2407069"/>
-                <a:gd name="connsiteX3" fmla="*/ 3431843 w 3432731"/>
-                <a:gd name="connsiteY3" fmla="*/ 0 h 2407069"/>
-                <a:gd name="connsiteX4" fmla="*/ 3431843 w 3432731"/>
-                <a:gd name="connsiteY4" fmla="*/ 2394658 h 2407069"/>
-                <a:gd name="connsiteX5" fmla="*/ 0 w 3432731"/>
-                <a:gd name="connsiteY5" fmla="*/ 2407069 h 2407069"/>
-                <a:gd name="connsiteX6" fmla="*/ 52989 w 3432731"/>
-                <a:gd name="connsiteY6" fmla="*/ 1311563 h 2407069"/>
-                <a:gd name="connsiteX0" fmla="*/ 52989 w 3432731"/>
-                <a:gd name="connsiteY0" fmla="*/ 1311563 h 2407069"/>
-                <a:gd name="connsiteX1" fmla="*/ 2109647 w 3432731"/>
-                <a:gd name="connsiteY1" fmla="*/ 1440872 h 2407069"/>
-                <a:gd name="connsiteX2" fmla="*/ 2155830 w 3432731"/>
-                <a:gd name="connsiteY2" fmla="*/ 9237 h 2407069"/>
-                <a:gd name="connsiteX3" fmla="*/ 3431843 w 3432731"/>
-                <a:gd name="connsiteY3" fmla="*/ 0 h 2407069"/>
-                <a:gd name="connsiteX4" fmla="*/ 3431843 w 3432731"/>
-                <a:gd name="connsiteY4" fmla="*/ 2394658 h 2407069"/>
-                <a:gd name="connsiteX5" fmla="*/ 0 w 3432731"/>
-                <a:gd name="connsiteY5" fmla="*/ 2407069 h 2407069"/>
-                <a:gd name="connsiteX6" fmla="*/ 52989 w 3432731"/>
-                <a:gd name="connsiteY6" fmla="*/ 1311563 h 2407069"/>
-                <a:gd name="connsiteX0" fmla="*/ 653352 w 3432731"/>
-                <a:gd name="connsiteY0" fmla="*/ 1366981 h 2407069"/>
-                <a:gd name="connsiteX1" fmla="*/ 2109647 w 3432731"/>
-                <a:gd name="connsiteY1" fmla="*/ 1440872 h 2407069"/>
-                <a:gd name="connsiteX2" fmla="*/ 2155830 w 3432731"/>
-                <a:gd name="connsiteY2" fmla="*/ 9237 h 2407069"/>
-                <a:gd name="connsiteX3" fmla="*/ 3431843 w 3432731"/>
-                <a:gd name="connsiteY3" fmla="*/ 0 h 2407069"/>
-                <a:gd name="connsiteX4" fmla="*/ 3431843 w 3432731"/>
-                <a:gd name="connsiteY4" fmla="*/ 2394658 h 2407069"/>
-                <a:gd name="connsiteX5" fmla="*/ 0 w 3432731"/>
-                <a:gd name="connsiteY5" fmla="*/ 2407069 h 2407069"/>
-                <a:gd name="connsiteX6" fmla="*/ 653352 w 3432731"/>
-                <a:gd name="connsiteY6" fmla="*/ 1366981 h 2407069"/>
-                <a:gd name="connsiteX0" fmla="*/ 25279 w 2804658"/>
-                <a:gd name="connsiteY0" fmla="*/ 1366981 h 2444014"/>
-                <a:gd name="connsiteX1" fmla="*/ 1481574 w 2804658"/>
-                <a:gd name="connsiteY1" fmla="*/ 1440872 h 2444014"/>
-                <a:gd name="connsiteX2" fmla="*/ 1527757 w 2804658"/>
-                <a:gd name="connsiteY2" fmla="*/ 9237 h 2444014"/>
-                <a:gd name="connsiteX3" fmla="*/ 2803770 w 2804658"/>
-                <a:gd name="connsiteY3" fmla="*/ 0 h 2444014"/>
-                <a:gd name="connsiteX4" fmla="*/ 2803770 w 2804658"/>
-                <a:gd name="connsiteY4" fmla="*/ 2394658 h 2444014"/>
-                <a:gd name="connsiteX5" fmla="*/ 0 w 2804658"/>
-                <a:gd name="connsiteY5" fmla="*/ 2444014 h 2444014"/>
-                <a:gd name="connsiteX6" fmla="*/ 25279 w 2804658"/>
-                <a:gd name="connsiteY6" fmla="*/ 1366981 h 2444014"/>
-                <a:gd name="connsiteX0" fmla="*/ 25279 w 2804658"/>
-                <a:gd name="connsiteY0" fmla="*/ 1366981 h 2444014"/>
-                <a:gd name="connsiteX1" fmla="*/ 1518519 w 2804658"/>
-                <a:gd name="connsiteY1" fmla="*/ 1376218 h 2444014"/>
-                <a:gd name="connsiteX2" fmla="*/ 1527757 w 2804658"/>
-                <a:gd name="connsiteY2" fmla="*/ 9237 h 2444014"/>
-                <a:gd name="connsiteX3" fmla="*/ 2803770 w 2804658"/>
-                <a:gd name="connsiteY3" fmla="*/ 0 h 2444014"/>
-                <a:gd name="connsiteX4" fmla="*/ 2803770 w 2804658"/>
-                <a:gd name="connsiteY4" fmla="*/ 2394658 h 2444014"/>
-                <a:gd name="connsiteX5" fmla="*/ 0 w 2804658"/>
-                <a:gd name="connsiteY5" fmla="*/ 2444014 h 2444014"/>
-                <a:gd name="connsiteX6" fmla="*/ 25279 w 2804658"/>
-                <a:gd name="connsiteY6" fmla="*/ 1366981 h 2444014"/>
-                <a:gd name="connsiteX0" fmla="*/ 25279 w 2804658"/>
-                <a:gd name="connsiteY0" fmla="*/ 1366981 h 2444014"/>
-                <a:gd name="connsiteX1" fmla="*/ 1490810 w 2804658"/>
-                <a:gd name="connsiteY1" fmla="*/ 1366982 h 2444014"/>
-                <a:gd name="connsiteX2" fmla="*/ 1527757 w 2804658"/>
-                <a:gd name="connsiteY2" fmla="*/ 9237 h 2444014"/>
-                <a:gd name="connsiteX3" fmla="*/ 2803770 w 2804658"/>
-                <a:gd name="connsiteY3" fmla="*/ 0 h 2444014"/>
-                <a:gd name="connsiteX4" fmla="*/ 2803770 w 2804658"/>
-                <a:gd name="connsiteY4" fmla="*/ 2394658 h 2444014"/>
-                <a:gd name="connsiteX5" fmla="*/ 0 w 2804658"/>
-                <a:gd name="connsiteY5" fmla="*/ 2444014 h 2444014"/>
-                <a:gd name="connsiteX6" fmla="*/ 25279 w 2804658"/>
-                <a:gd name="connsiteY6" fmla="*/ 1366981 h 2444014"/>
-                <a:gd name="connsiteX0" fmla="*/ 25279 w 2803770"/>
-                <a:gd name="connsiteY0" fmla="*/ 1366981 h 2444014"/>
-                <a:gd name="connsiteX1" fmla="*/ 1490810 w 2803770"/>
-                <a:gd name="connsiteY1" fmla="*/ 1366982 h 2444014"/>
-                <a:gd name="connsiteX2" fmla="*/ 1527757 w 2803770"/>
-                <a:gd name="connsiteY2" fmla="*/ 9237 h 2444014"/>
-                <a:gd name="connsiteX3" fmla="*/ 2803770 w 2803770"/>
-                <a:gd name="connsiteY3" fmla="*/ 0 h 2444014"/>
-                <a:gd name="connsiteX4" fmla="*/ 2803770 w 2803770"/>
-                <a:gd name="connsiteY4" fmla="*/ 2394658 h 2444014"/>
-                <a:gd name="connsiteX5" fmla="*/ 0 w 2803770"/>
-                <a:gd name="connsiteY5" fmla="*/ 2444014 h 2444014"/>
-                <a:gd name="connsiteX6" fmla="*/ 25279 w 2803770"/>
-                <a:gd name="connsiteY6" fmla="*/ 1366981 h 2444014"/>
-                <a:gd name="connsiteX0" fmla="*/ 25279 w 2803770"/>
-                <a:gd name="connsiteY0" fmla="*/ 1366981 h 2444014"/>
-                <a:gd name="connsiteX1" fmla="*/ 1490810 w 2803770"/>
-                <a:gd name="connsiteY1" fmla="*/ 1366982 h 2444014"/>
-                <a:gd name="connsiteX2" fmla="*/ 1527757 w 2803770"/>
-                <a:gd name="connsiteY2" fmla="*/ 9237 h 2444014"/>
-                <a:gd name="connsiteX3" fmla="*/ 2803770 w 2803770"/>
-                <a:gd name="connsiteY3" fmla="*/ 0 h 2444014"/>
-                <a:gd name="connsiteX4" fmla="*/ 2803770 w 2803770"/>
-                <a:gd name="connsiteY4" fmla="*/ 2394658 h 2444014"/>
-                <a:gd name="connsiteX5" fmla="*/ 0 w 2803770"/>
-                <a:gd name="connsiteY5" fmla="*/ 2444014 h 2444014"/>
-                <a:gd name="connsiteX6" fmla="*/ 25279 w 2803770"/>
-                <a:gd name="connsiteY6" fmla="*/ 1366981 h 2444014"/>
-                <a:gd name="connsiteX0" fmla="*/ 0 w 2778491"/>
-                <a:gd name="connsiteY0" fmla="*/ 1366981 h 2394658"/>
-                <a:gd name="connsiteX1" fmla="*/ 1465531 w 2778491"/>
-                <a:gd name="connsiteY1" fmla="*/ 1366982 h 2394658"/>
-                <a:gd name="connsiteX2" fmla="*/ 1502478 w 2778491"/>
-                <a:gd name="connsiteY2" fmla="*/ 9237 h 2394658"/>
-                <a:gd name="connsiteX3" fmla="*/ 2778491 w 2778491"/>
-                <a:gd name="connsiteY3" fmla="*/ 0 h 2394658"/>
-                <a:gd name="connsiteX4" fmla="*/ 2778491 w 2778491"/>
-                <a:gd name="connsiteY4" fmla="*/ 2394658 h 2394658"/>
-                <a:gd name="connsiteX5" fmla="*/ 19171 w 2778491"/>
-                <a:gd name="connsiteY5" fmla="*/ 2231289 h 2394658"/>
-                <a:gd name="connsiteX6" fmla="*/ 0 w 2778491"/>
-                <a:gd name="connsiteY6" fmla="*/ 1366981 h 2394658"/>
-                <a:gd name="connsiteX0" fmla="*/ 0 w 2759441"/>
-                <a:gd name="connsiteY0" fmla="*/ 1303481 h 2394658"/>
-                <a:gd name="connsiteX1" fmla="*/ 1446481 w 2759441"/>
-                <a:gd name="connsiteY1" fmla="*/ 1366982 h 2394658"/>
-                <a:gd name="connsiteX2" fmla="*/ 1483428 w 2759441"/>
-                <a:gd name="connsiteY2" fmla="*/ 9237 h 2394658"/>
-                <a:gd name="connsiteX3" fmla="*/ 2759441 w 2759441"/>
-                <a:gd name="connsiteY3" fmla="*/ 0 h 2394658"/>
-                <a:gd name="connsiteX4" fmla="*/ 2759441 w 2759441"/>
-                <a:gd name="connsiteY4" fmla="*/ 2394658 h 2394658"/>
-                <a:gd name="connsiteX5" fmla="*/ 121 w 2759441"/>
-                <a:gd name="connsiteY5" fmla="*/ 2231289 h 2394658"/>
-                <a:gd name="connsiteX6" fmla="*/ 0 w 2759441"/>
-                <a:gd name="connsiteY6" fmla="*/ 1303481 h 2394658"/>
-                <a:gd name="connsiteX0" fmla="*/ 0 w 2759441"/>
-                <a:gd name="connsiteY0" fmla="*/ 1303481 h 2394658"/>
-                <a:gd name="connsiteX1" fmla="*/ 1827481 w 2759441"/>
-                <a:gd name="connsiteY1" fmla="*/ 1313007 h 2394658"/>
-                <a:gd name="connsiteX2" fmla="*/ 1483428 w 2759441"/>
-                <a:gd name="connsiteY2" fmla="*/ 9237 h 2394658"/>
-                <a:gd name="connsiteX3" fmla="*/ 2759441 w 2759441"/>
-                <a:gd name="connsiteY3" fmla="*/ 0 h 2394658"/>
-                <a:gd name="connsiteX4" fmla="*/ 2759441 w 2759441"/>
-                <a:gd name="connsiteY4" fmla="*/ 2394658 h 2394658"/>
-                <a:gd name="connsiteX5" fmla="*/ 121 w 2759441"/>
-                <a:gd name="connsiteY5" fmla="*/ 2231289 h 2394658"/>
-                <a:gd name="connsiteX6" fmla="*/ 0 w 2759441"/>
-                <a:gd name="connsiteY6" fmla="*/ 1303481 h 2394658"/>
-                <a:gd name="connsiteX0" fmla="*/ 0 w 2759441"/>
-                <a:gd name="connsiteY0" fmla="*/ 1303481 h 2231289"/>
-                <a:gd name="connsiteX1" fmla="*/ 1827481 w 2759441"/>
-                <a:gd name="connsiteY1" fmla="*/ 1313007 h 2231289"/>
-                <a:gd name="connsiteX2" fmla="*/ 1483428 w 2759441"/>
-                <a:gd name="connsiteY2" fmla="*/ 9237 h 2231289"/>
-                <a:gd name="connsiteX3" fmla="*/ 2759441 w 2759441"/>
-                <a:gd name="connsiteY3" fmla="*/ 0 h 2231289"/>
-                <a:gd name="connsiteX4" fmla="*/ 1848216 w 2759441"/>
-                <a:gd name="connsiteY4" fmla="*/ 2226383 h 2231289"/>
-                <a:gd name="connsiteX5" fmla="*/ 121 w 2759441"/>
-                <a:gd name="connsiteY5" fmla="*/ 2231289 h 2231289"/>
-                <a:gd name="connsiteX6" fmla="*/ 0 w 2759441"/>
-                <a:gd name="connsiteY6" fmla="*/ 1303481 h 2231289"/>
-                <a:gd name="connsiteX0" fmla="*/ 0 w 2759441"/>
-                <a:gd name="connsiteY0" fmla="*/ 1303481 h 2231289"/>
-                <a:gd name="connsiteX1" fmla="*/ 925781 w 2759441"/>
-                <a:gd name="connsiteY1" fmla="*/ 1300307 h 2231289"/>
-                <a:gd name="connsiteX2" fmla="*/ 1483428 w 2759441"/>
-                <a:gd name="connsiteY2" fmla="*/ 9237 h 2231289"/>
-                <a:gd name="connsiteX3" fmla="*/ 2759441 w 2759441"/>
-                <a:gd name="connsiteY3" fmla="*/ 0 h 2231289"/>
-                <a:gd name="connsiteX4" fmla="*/ 1848216 w 2759441"/>
-                <a:gd name="connsiteY4" fmla="*/ 2226383 h 2231289"/>
-                <a:gd name="connsiteX5" fmla="*/ 121 w 2759441"/>
-                <a:gd name="connsiteY5" fmla="*/ 2231289 h 2231289"/>
-                <a:gd name="connsiteX6" fmla="*/ 0 w 2759441"/>
-                <a:gd name="connsiteY6" fmla="*/ 1303481 h 2231289"/>
-                <a:gd name="connsiteX0" fmla="*/ 0 w 2759441"/>
-                <a:gd name="connsiteY0" fmla="*/ 1303481 h 2231289"/>
-                <a:gd name="connsiteX1" fmla="*/ 925781 w 2759441"/>
-                <a:gd name="connsiteY1" fmla="*/ 1300307 h 2231289"/>
-                <a:gd name="connsiteX2" fmla="*/ 991303 w 2759441"/>
-                <a:gd name="connsiteY2" fmla="*/ 294987 h 2231289"/>
-                <a:gd name="connsiteX3" fmla="*/ 2759441 w 2759441"/>
-                <a:gd name="connsiteY3" fmla="*/ 0 h 2231289"/>
-                <a:gd name="connsiteX4" fmla="*/ 1848216 w 2759441"/>
-                <a:gd name="connsiteY4" fmla="*/ 2226383 h 2231289"/>
-                <a:gd name="connsiteX5" fmla="*/ 121 w 2759441"/>
-                <a:gd name="connsiteY5" fmla="*/ 2231289 h 2231289"/>
-                <a:gd name="connsiteX6" fmla="*/ 0 w 2759441"/>
-                <a:gd name="connsiteY6" fmla="*/ 1303481 h 2231289"/>
-                <a:gd name="connsiteX0" fmla="*/ 0 w 1899016"/>
-                <a:gd name="connsiteY0" fmla="*/ 1008494 h 1936302"/>
-                <a:gd name="connsiteX1" fmla="*/ 925781 w 1899016"/>
-                <a:gd name="connsiteY1" fmla="*/ 1005320 h 1936302"/>
-                <a:gd name="connsiteX2" fmla="*/ 991303 w 1899016"/>
-                <a:gd name="connsiteY2" fmla="*/ 0 h 1936302"/>
-                <a:gd name="connsiteX3" fmla="*/ 1899016 w 1899016"/>
-                <a:gd name="connsiteY3" fmla="*/ 12988 h 1936302"/>
-                <a:gd name="connsiteX4" fmla="*/ 1848216 w 1899016"/>
-                <a:gd name="connsiteY4" fmla="*/ 1931396 h 1936302"/>
-                <a:gd name="connsiteX5" fmla="*/ 121 w 1899016"/>
-                <a:gd name="connsiteY5" fmla="*/ 1936302 h 1936302"/>
-                <a:gd name="connsiteX6" fmla="*/ 0 w 1899016"/>
-                <a:gd name="connsiteY6" fmla="*/ 1008494 h 1936302"/>
-                <a:gd name="connsiteX0" fmla="*/ 0 w 1899016"/>
-                <a:gd name="connsiteY0" fmla="*/ 1008494 h 1936302"/>
-                <a:gd name="connsiteX1" fmla="*/ 925781 w 1899016"/>
-                <a:gd name="connsiteY1" fmla="*/ 1005320 h 1936302"/>
-                <a:gd name="connsiteX2" fmla="*/ 991303 w 1899016"/>
-                <a:gd name="connsiteY2" fmla="*/ 0 h 1936302"/>
-                <a:gd name="connsiteX3" fmla="*/ 1899016 w 1899016"/>
-                <a:gd name="connsiteY3" fmla="*/ 12988 h 1936302"/>
-                <a:gd name="connsiteX4" fmla="*/ 1895841 w 1899016"/>
-                <a:gd name="connsiteY4" fmla="*/ 1839321 h 1936302"/>
-                <a:gd name="connsiteX5" fmla="*/ 121 w 1899016"/>
-                <a:gd name="connsiteY5" fmla="*/ 1936302 h 1936302"/>
-                <a:gd name="connsiteX6" fmla="*/ 0 w 1899016"/>
-                <a:gd name="connsiteY6" fmla="*/ 1008494 h 1936302"/>
-                <a:gd name="connsiteX0" fmla="*/ 53855 w 1898896"/>
-                <a:gd name="connsiteY0" fmla="*/ 929119 h 1936302"/>
-                <a:gd name="connsiteX1" fmla="*/ 925661 w 1898896"/>
-                <a:gd name="connsiteY1" fmla="*/ 1005320 h 1936302"/>
-                <a:gd name="connsiteX2" fmla="*/ 991183 w 1898896"/>
-                <a:gd name="connsiteY2" fmla="*/ 0 h 1936302"/>
-                <a:gd name="connsiteX3" fmla="*/ 1898896 w 1898896"/>
-                <a:gd name="connsiteY3" fmla="*/ 12988 h 1936302"/>
-                <a:gd name="connsiteX4" fmla="*/ 1895721 w 1898896"/>
-                <a:gd name="connsiteY4" fmla="*/ 1839321 h 1936302"/>
-                <a:gd name="connsiteX5" fmla="*/ 1 w 1898896"/>
-                <a:gd name="connsiteY5" fmla="*/ 1936302 h 1936302"/>
-                <a:gd name="connsiteX6" fmla="*/ 53855 w 1898896"/>
-                <a:gd name="connsiteY6" fmla="*/ 929119 h 1936302"/>
-                <a:gd name="connsiteX0" fmla="*/ 53855 w 1898896"/>
-                <a:gd name="connsiteY0" fmla="*/ 929119 h 1936302"/>
-                <a:gd name="connsiteX1" fmla="*/ 982811 w 1898896"/>
-                <a:gd name="connsiteY1" fmla="*/ 932295 h 1936302"/>
-                <a:gd name="connsiteX2" fmla="*/ 991183 w 1898896"/>
-                <a:gd name="connsiteY2" fmla="*/ 0 h 1936302"/>
-                <a:gd name="connsiteX3" fmla="*/ 1898896 w 1898896"/>
-                <a:gd name="connsiteY3" fmla="*/ 12988 h 1936302"/>
-                <a:gd name="connsiteX4" fmla="*/ 1895721 w 1898896"/>
-                <a:gd name="connsiteY4" fmla="*/ 1839321 h 1936302"/>
-                <a:gd name="connsiteX5" fmla="*/ 1 w 1898896"/>
-                <a:gd name="connsiteY5" fmla="*/ 1936302 h 1936302"/>
-                <a:gd name="connsiteX6" fmla="*/ 53855 w 1898896"/>
-                <a:gd name="connsiteY6" fmla="*/ 929119 h 1936302"/>
-                <a:gd name="connsiteX0" fmla="*/ 0 w 1845041"/>
-                <a:gd name="connsiteY0" fmla="*/ 929119 h 1850577"/>
-                <a:gd name="connsiteX1" fmla="*/ 928956 w 1845041"/>
-                <a:gd name="connsiteY1" fmla="*/ 932295 h 1850577"/>
-                <a:gd name="connsiteX2" fmla="*/ 937328 w 1845041"/>
-                <a:gd name="connsiteY2" fmla="*/ 0 h 1850577"/>
-                <a:gd name="connsiteX3" fmla="*/ 1845041 w 1845041"/>
-                <a:gd name="connsiteY3" fmla="*/ 12988 h 1850577"/>
-                <a:gd name="connsiteX4" fmla="*/ 1841866 w 1845041"/>
-                <a:gd name="connsiteY4" fmla="*/ 1839321 h 1850577"/>
-                <a:gd name="connsiteX5" fmla="*/ 15996 w 1845041"/>
-                <a:gd name="connsiteY5" fmla="*/ 1850577 h 1850577"/>
-                <a:gd name="connsiteX6" fmla="*/ 0 w 1845041"/>
-                <a:gd name="connsiteY6" fmla="*/ 929119 h 1850577"/>
-                <a:gd name="connsiteX0" fmla="*/ 0 w 1845041"/>
-                <a:gd name="connsiteY0" fmla="*/ 929119 h 1850577"/>
-                <a:gd name="connsiteX1" fmla="*/ 928956 w 1845041"/>
-                <a:gd name="connsiteY1" fmla="*/ 932295 h 1850577"/>
-                <a:gd name="connsiteX2" fmla="*/ 937328 w 1845041"/>
-                <a:gd name="connsiteY2" fmla="*/ 0 h 1850577"/>
-                <a:gd name="connsiteX3" fmla="*/ 1845041 w 1845041"/>
-                <a:gd name="connsiteY3" fmla="*/ 12988 h 1850577"/>
-                <a:gd name="connsiteX4" fmla="*/ 1841866 w 1845041"/>
-                <a:gd name="connsiteY4" fmla="*/ 1839321 h 1850577"/>
-                <a:gd name="connsiteX5" fmla="*/ 15996 w 1845041"/>
-                <a:gd name="connsiteY5" fmla="*/ 1850577 h 1850577"/>
-                <a:gd name="connsiteX6" fmla="*/ 0 w 1845041"/>
-                <a:gd name="connsiteY6" fmla="*/ 929119 h 1850577"/>
-                <a:gd name="connsiteX0" fmla="*/ 0 w 1845041"/>
-                <a:gd name="connsiteY0" fmla="*/ 929119 h 1850577"/>
-                <a:gd name="connsiteX1" fmla="*/ 928956 w 1845041"/>
-                <a:gd name="connsiteY1" fmla="*/ 932295 h 1850577"/>
-                <a:gd name="connsiteX2" fmla="*/ 937328 w 1845041"/>
-                <a:gd name="connsiteY2" fmla="*/ 0 h 1850577"/>
-                <a:gd name="connsiteX3" fmla="*/ 1845041 w 1845041"/>
-                <a:gd name="connsiteY3" fmla="*/ 12988 h 1850577"/>
-                <a:gd name="connsiteX4" fmla="*/ 1841866 w 1845041"/>
-                <a:gd name="connsiteY4" fmla="*/ 1839321 h 1850577"/>
-                <a:gd name="connsiteX5" fmla="*/ 15996 w 1845041"/>
-                <a:gd name="connsiteY5" fmla="*/ 1850577 h 1850577"/>
-                <a:gd name="connsiteX6" fmla="*/ 0 w 1845041"/>
-                <a:gd name="connsiteY6" fmla="*/ 929119 h 1850577"/>
-                <a:gd name="connsiteX0" fmla="*/ 0 w 1845041"/>
-                <a:gd name="connsiteY0" fmla="*/ 929119 h 1850577"/>
-                <a:gd name="connsiteX1" fmla="*/ 928956 w 1845041"/>
-                <a:gd name="connsiteY1" fmla="*/ 932295 h 1850577"/>
-                <a:gd name="connsiteX2" fmla="*/ 937328 w 1845041"/>
-                <a:gd name="connsiteY2" fmla="*/ 0 h 1850577"/>
-                <a:gd name="connsiteX3" fmla="*/ 1845041 w 1845041"/>
-                <a:gd name="connsiteY3" fmla="*/ 12988 h 1850577"/>
-                <a:gd name="connsiteX4" fmla="*/ 1841866 w 1845041"/>
-                <a:gd name="connsiteY4" fmla="*/ 1839321 h 1850577"/>
-                <a:gd name="connsiteX5" fmla="*/ 15996 w 1845041"/>
-                <a:gd name="connsiteY5" fmla="*/ 1850577 h 1850577"/>
-                <a:gd name="connsiteX6" fmla="*/ 0 w 1845041"/>
-                <a:gd name="connsiteY6" fmla="*/ 929119 h 1850577"/>
-                <a:gd name="connsiteX0" fmla="*/ 0 w 1845041"/>
-                <a:gd name="connsiteY0" fmla="*/ 929119 h 1850577"/>
-                <a:gd name="connsiteX1" fmla="*/ 928956 w 1845041"/>
-                <a:gd name="connsiteY1" fmla="*/ 932295 h 1850577"/>
-                <a:gd name="connsiteX2" fmla="*/ 937328 w 1845041"/>
-                <a:gd name="connsiteY2" fmla="*/ 0 h 1850577"/>
-                <a:gd name="connsiteX3" fmla="*/ 1845041 w 1845041"/>
-                <a:gd name="connsiteY3" fmla="*/ 12988 h 1850577"/>
-                <a:gd name="connsiteX4" fmla="*/ 1841866 w 1845041"/>
-                <a:gd name="connsiteY4" fmla="*/ 1839321 h 1850577"/>
-                <a:gd name="connsiteX5" fmla="*/ 15996 w 1845041"/>
-                <a:gd name="connsiteY5" fmla="*/ 1850577 h 1850577"/>
-                <a:gd name="connsiteX6" fmla="*/ 0 w 1845041"/>
-                <a:gd name="connsiteY6" fmla="*/ 929119 h 1850577"/>
-                <a:gd name="connsiteX0" fmla="*/ 0 w 1976213"/>
-                <a:gd name="connsiteY0" fmla="*/ 929119 h 1850577"/>
-                <a:gd name="connsiteX1" fmla="*/ 928956 w 1976213"/>
-                <a:gd name="connsiteY1" fmla="*/ 932295 h 1850577"/>
-                <a:gd name="connsiteX2" fmla="*/ 937328 w 1976213"/>
-                <a:gd name="connsiteY2" fmla="*/ 0 h 1850577"/>
-                <a:gd name="connsiteX3" fmla="*/ 1845041 w 1976213"/>
-                <a:gd name="connsiteY3" fmla="*/ 12988 h 1850577"/>
-                <a:gd name="connsiteX4" fmla="*/ 1837897 w 1976213"/>
-                <a:gd name="connsiteY4" fmla="*/ 311944 h 1850577"/>
-                <a:gd name="connsiteX5" fmla="*/ 1841866 w 1976213"/>
-                <a:gd name="connsiteY5" fmla="*/ 1839321 h 1850577"/>
-                <a:gd name="connsiteX6" fmla="*/ 15996 w 1976213"/>
-                <a:gd name="connsiteY6" fmla="*/ 1850577 h 1850577"/>
-                <a:gd name="connsiteX7" fmla="*/ 0 w 1976213"/>
-                <a:gd name="connsiteY7" fmla="*/ 929119 h 1850577"/>
-                <a:gd name="connsiteX0" fmla="*/ 0 w 1910587"/>
-                <a:gd name="connsiteY0" fmla="*/ 929119 h 1850577"/>
-                <a:gd name="connsiteX1" fmla="*/ 928956 w 1910587"/>
-                <a:gd name="connsiteY1" fmla="*/ 932295 h 1850577"/>
-                <a:gd name="connsiteX2" fmla="*/ 937328 w 1910587"/>
-                <a:gd name="connsiteY2" fmla="*/ 0 h 1850577"/>
-                <a:gd name="connsiteX3" fmla="*/ 1845041 w 1910587"/>
-                <a:gd name="connsiteY3" fmla="*/ 12988 h 1850577"/>
-                <a:gd name="connsiteX4" fmla="*/ 1837897 w 1910587"/>
-                <a:gd name="connsiteY4" fmla="*/ 311944 h 1850577"/>
-                <a:gd name="connsiteX5" fmla="*/ 1841866 w 1910587"/>
-                <a:gd name="connsiteY5" fmla="*/ 1839321 h 1850577"/>
-                <a:gd name="connsiteX6" fmla="*/ 15996 w 1910587"/>
-                <a:gd name="connsiteY6" fmla="*/ 1850577 h 1850577"/>
-                <a:gd name="connsiteX7" fmla="*/ 0 w 1910587"/>
-                <a:gd name="connsiteY7" fmla="*/ 929119 h 1850577"/>
-                <a:gd name="connsiteX0" fmla="*/ 0 w 2018576"/>
-                <a:gd name="connsiteY0" fmla="*/ 929119 h 1850577"/>
-                <a:gd name="connsiteX1" fmla="*/ 928956 w 2018576"/>
-                <a:gd name="connsiteY1" fmla="*/ 932295 h 1850577"/>
-                <a:gd name="connsiteX2" fmla="*/ 937328 w 2018576"/>
-                <a:gd name="connsiteY2" fmla="*/ 0 h 1850577"/>
-                <a:gd name="connsiteX3" fmla="*/ 1845041 w 2018576"/>
-                <a:gd name="connsiteY3" fmla="*/ 12988 h 1850577"/>
-                <a:gd name="connsiteX4" fmla="*/ 1841866 w 2018576"/>
-                <a:gd name="connsiteY4" fmla="*/ 1839321 h 1850577"/>
-                <a:gd name="connsiteX5" fmla="*/ 15996 w 2018576"/>
-                <a:gd name="connsiteY5" fmla="*/ 1850577 h 1850577"/>
-                <a:gd name="connsiteX6" fmla="*/ 0 w 2018576"/>
-                <a:gd name="connsiteY6" fmla="*/ 929119 h 1850577"/>
-                <a:gd name="connsiteX0" fmla="*/ 0 w 1845041"/>
-                <a:gd name="connsiteY0" fmla="*/ 929119 h 1850577"/>
-                <a:gd name="connsiteX1" fmla="*/ 928956 w 1845041"/>
-                <a:gd name="connsiteY1" fmla="*/ 932295 h 1850577"/>
-                <a:gd name="connsiteX2" fmla="*/ 937328 w 1845041"/>
-                <a:gd name="connsiteY2" fmla="*/ 0 h 1850577"/>
-                <a:gd name="connsiteX3" fmla="*/ 1845041 w 1845041"/>
-                <a:gd name="connsiteY3" fmla="*/ 12988 h 1850577"/>
-                <a:gd name="connsiteX4" fmla="*/ 1841866 w 1845041"/>
-                <a:gd name="connsiteY4" fmla="*/ 1839321 h 1850577"/>
-                <a:gd name="connsiteX5" fmla="*/ 15996 w 1845041"/>
-                <a:gd name="connsiteY5" fmla="*/ 1850577 h 1850577"/>
-                <a:gd name="connsiteX6" fmla="*/ 0 w 1845041"/>
-                <a:gd name="connsiteY6" fmla="*/ 929119 h 1850577"/>
-                <a:gd name="connsiteX0" fmla="*/ 0 w 1852184"/>
-                <a:gd name="connsiteY0" fmla="*/ 930418 h 1851876"/>
-                <a:gd name="connsiteX1" fmla="*/ 928956 w 1852184"/>
-                <a:gd name="connsiteY1" fmla="*/ 933594 h 1851876"/>
-                <a:gd name="connsiteX2" fmla="*/ 937328 w 1852184"/>
-                <a:gd name="connsiteY2" fmla="*/ 1299 h 1851876"/>
-                <a:gd name="connsiteX3" fmla="*/ 1852184 w 1852184"/>
-                <a:gd name="connsiteY3" fmla="*/ 0 h 1851876"/>
-                <a:gd name="connsiteX4" fmla="*/ 1841866 w 1852184"/>
-                <a:gd name="connsiteY4" fmla="*/ 1840620 h 1851876"/>
-                <a:gd name="connsiteX5" fmla="*/ 15996 w 1852184"/>
-                <a:gd name="connsiteY5" fmla="*/ 1851876 h 1851876"/>
-                <a:gd name="connsiteX6" fmla="*/ 0 w 1852184"/>
-                <a:gd name="connsiteY6" fmla="*/ 930418 h 1851876"/>
-                <a:gd name="connsiteX0" fmla="*/ 0 w 1852184"/>
-                <a:gd name="connsiteY0" fmla="*/ 931500 h 1852958"/>
-                <a:gd name="connsiteX1" fmla="*/ 928956 w 1852184"/>
-                <a:gd name="connsiteY1" fmla="*/ 934676 h 1852958"/>
-                <a:gd name="connsiteX2" fmla="*/ 927803 w 1852184"/>
-                <a:gd name="connsiteY2" fmla="*/ 0 h 1852958"/>
-                <a:gd name="connsiteX3" fmla="*/ 1852184 w 1852184"/>
-                <a:gd name="connsiteY3" fmla="*/ 1082 h 1852958"/>
-                <a:gd name="connsiteX4" fmla="*/ 1841866 w 1852184"/>
-                <a:gd name="connsiteY4" fmla="*/ 1841702 h 1852958"/>
-                <a:gd name="connsiteX5" fmla="*/ 15996 w 1852184"/>
-                <a:gd name="connsiteY5" fmla="*/ 1852958 h 1852958"/>
-                <a:gd name="connsiteX6" fmla="*/ 0 w 1852184"/>
-                <a:gd name="connsiteY6" fmla="*/ 931500 h 1852958"/>
-                <a:gd name="connsiteX0" fmla="*/ 0 w 1841990"/>
-                <a:gd name="connsiteY0" fmla="*/ 931500 h 1852958"/>
-                <a:gd name="connsiteX1" fmla="*/ 928956 w 1841990"/>
-                <a:gd name="connsiteY1" fmla="*/ 934676 h 1852958"/>
-                <a:gd name="connsiteX2" fmla="*/ 927803 w 1841990"/>
-                <a:gd name="connsiteY2" fmla="*/ 0 h 1852958"/>
-                <a:gd name="connsiteX3" fmla="*/ 1837896 w 1841990"/>
-                <a:gd name="connsiteY3" fmla="*/ 1082 h 1852958"/>
-                <a:gd name="connsiteX4" fmla="*/ 1841866 w 1841990"/>
-                <a:gd name="connsiteY4" fmla="*/ 1841702 h 1852958"/>
-                <a:gd name="connsiteX5" fmla="*/ 15996 w 1841990"/>
-                <a:gd name="connsiteY5" fmla="*/ 1852958 h 1852958"/>
-                <a:gd name="connsiteX6" fmla="*/ 0 w 1841990"/>
-                <a:gd name="connsiteY6" fmla="*/ 931500 h 1852958"/>
-                <a:gd name="connsiteX0" fmla="*/ 0 w 1837227"/>
-                <a:gd name="connsiteY0" fmla="*/ 917213 h 1852958"/>
-                <a:gd name="connsiteX1" fmla="*/ 924193 w 1837227"/>
-                <a:gd name="connsiteY1" fmla="*/ 934676 h 1852958"/>
-                <a:gd name="connsiteX2" fmla="*/ 923040 w 1837227"/>
-                <a:gd name="connsiteY2" fmla="*/ 0 h 1852958"/>
-                <a:gd name="connsiteX3" fmla="*/ 1833133 w 1837227"/>
-                <a:gd name="connsiteY3" fmla="*/ 1082 h 1852958"/>
-                <a:gd name="connsiteX4" fmla="*/ 1837103 w 1837227"/>
-                <a:gd name="connsiteY4" fmla="*/ 1841702 h 1852958"/>
-                <a:gd name="connsiteX5" fmla="*/ 11233 w 1837227"/>
-                <a:gd name="connsiteY5" fmla="*/ 1852958 h 1852958"/>
-                <a:gd name="connsiteX6" fmla="*/ 0 w 1837227"/>
-                <a:gd name="connsiteY6" fmla="*/ 917213 h 1852958"/>
-                <a:gd name="connsiteX0" fmla="*/ 0 w 1827702"/>
-                <a:gd name="connsiteY0" fmla="*/ 921976 h 1852958"/>
-                <a:gd name="connsiteX1" fmla="*/ 914668 w 1827702"/>
-                <a:gd name="connsiteY1" fmla="*/ 934676 h 1852958"/>
-                <a:gd name="connsiteX2" fmla="*/ 913515 w 1827702"/>
-                <a:gd name="connsiteY2" fmla="*/ 0 h 1852958"/>
-                <a:gd name="connsiteX3" fmla="*/ 1823608 w 1827702"/>
-                <a:gd name="connsiteY3" fmla="*/ 1082 h 1852958"/>
-                <a:gd name="connsiteX4" fmla="*/ 1827578 w 1827702"/>
-                <a:gd name="connsiteY4" fmla="*/ 1841702 h 1852958"/>
-                <a:gd name="connsiteX5" fmla="*/ 1708 w 1827702"/>
-                <a:gd name="connsiteY5" fmla="*/ 1852958 h 1852958"/>
-                <a:gd name="connsiteX6" fmla="*/ 0 w 1827702"/>
-                <a:gd name="connsiteY6" fmla="*/ 921976 h 1852958"/>
-                <a:gd name="connsiteX0" fmla="*/ 0 w 1827702"/>
-                <a:gd name="connsiteY0" fmla="*/ 921976 h 1852958"/>
-                <a:gd name="connsiteX1" fmla="*/ 912287 w 1827702"/>
-                <a:gd name="connsiteY1" fmla="*/ 922770 h 1852958"/>
-                <a:gd name="connsiteX2" fmla="*/ 913515 w 1827702"/>
-                <a:gd name="connsiteY2" fmla="*/ 0 h 1852958"/>
-                <a:gd name="connsiteX3" fmla="*/ 1823608 w 1827702"/>
-                <a:gd name="connsiteY3" fmla="*/ 1082 h 1852958"/>
-                <a:gd name="connsiteX4" fmla="*/ 1827578 w 1827702"/>
-                <a:gd name="connsiteY4" fmla="*/ 1841702 h 1852958"/>
-                <a:gd name="connsiteX5" fmla="*/ 1708 w 1827702"/>
-                <a:gd name="connsiteY5" fmla="*/ 1852958 h 1852958"/>
-                <a:gd name="connsiteX6" fmla="*/ 0 w 1827702"/>
-                <a:gd name="connsiteY6" fmla="*/ 921976 h 1852958"/>
-                <a:gd name="connsiteX0" fmla="*/ 0 w 1827702"/>
-                <a:gd name="connsiteY0" fmla="*/ 921976 h 1841702"/>
-                <a:gd name="connsiteX1" fmla="*/ 912287 w 1827702"/>
-                <a:gd name="connsiteY1" fmla="*/ 922770 h 1841702"/>
-                <a:gd name="connsiteX2" fmla="*/ 913515 w 1827702"/>
-                <a:gd name="connsiteY2" fmla="*/ 0 h 1841702"/>
-                <a:gd name="connsiteX3" fmla="*/ 1823608 w 1827702"/>
-                <a:gd name="connsiteY3" fmla="*/ 1082 h 1841702"/>
-                <a:gd name="connsiteX4" fmla="*/ 1827578 w 1827702"/>
-                <a:gd name="connsiteY4" fmla="*/ 1841702 h 1841702"/>
-                <a:gd name="connsiteX5" fmla="*/ 8852 w 1827702"/>
-                <a:gd name="connsiteY5" fmla="*/ 1833908 h 1841702"/>
-                <a:gd name="connsiteX6" fmla="*/ 0 w 1827702"/>
-                <a:gd name="connsiteY6" fmla="*/ 921976 h 1841702"/>
-              </a:gdLst>
-              <a:ahLst/>
-              <a:cxnLst>
-                <a:cxn ang="0">
-                  <a:pos x="connsiteX0" y="connsiteY0"/>
-                </a:cxn>
-                <a:cxn ang="0">
-                  <a:pos x="connsiteX1" y="connsiteY1"/>
-                </a:cxn>
-                <a:cxn ang="0">
-                  <a:pos x="connsiteX2" y="connsiteY2"/>
-                </a:cxn>
-                <a:cxn ang="0">
-                  <a:pos x="connsiteX3" y="connsiteY3"/>
-                </a:cxn>
-                <a:cxn ang="0">
-                  <a:pos x="connsiteX4" y="connsiteY4"/>
-                </a:cxn>
-                <a:cxn ang="0">
-                  <a:pos x="connsiteX5" y="connsiteY5"/>
-                </a:cxn>
-                <a:cxn ang="0">
-                  <a:pos x="connsiteX6" y="connsiteY6"/>
-                </a:cxn>
-              </a:cxnLst>
-              <a:rect l="l" t="t" r="r" b="b"/>
-              <a:pathLst>
-                <a:path w="1827702" h="1841702">
-                  <a:moveTo>
-                    <a:pt x="0" y="921976"/>
-                  </a:moveTo>
-                  <a:lnTo>
-                    <a:pt x="912287" y="922770"/>
-                  </a:lnTo>
-                  <a:cubicBezTo>
-                    <a:pt x="915078" y="612005"/>
-                    <a:pt x="910724" y="310765"/>
-                    <a:pt x="913515" y="0"/>
-                  </a:cubicBezTo>
-                  <a:lnTo>
-                    <a:pt x="1823608" y="1082"/>
-                  </a:lnTo>
-                  <a:cubicBezTo>
-                    <a:pt x="1822550" y="609860"/>
-                    <a:pt x="1828636" y="1232924"/>
-                    <a:pt x="1827578" y="1841702"/>
-                  </a:cubicBezTo>
-                  <a:lnTo>
-                    <a:pt x="8852" y="1833908"/>
-                  </a:lnTo>
-                  <a:cubicBezTo>
-                    <a:pt x="8283" y="1523581"/>
-                    <a:pt x="569" y="1232303"/>
-                    <a:pt x="0" y="921976"/>
-                  </a:cubicBezTo>
-                  <a:close/>
-                </a:path>
-              </a:pathLst>
-            </a:custGeom>
-            <a:noFill/>
-            <a:ln w="25400">
-              <a:solidFill>
-                <a:schemeClr val="tx1"/>
-              </a:solidFill>
-            </a:ln>
-          </p:spPr>
-          <p:style>
-            <a:lnRef idx="2">
-              <a:schemeClr val="accent1">
-                <a:shade val="50000"/>
-              </a:schemeClr>
-            </a:lnRef>
-            <a:fillRef idx="1">
-              <a:schemeClr val="accent1"/>
-            </a:fillRef>
-            <a:effectRef idx="0">
-              <a:schemeClr val="accent1"/>
-            </a:effectRef>
-            <a:fontRef idx="minor">
-              <a:schemeClr val="lt1"/>
-            </a:fontRef>
-          </p:style>
-          <p:txBody>
-            <a:bodyPr rtlCol="0" anchor="ctr"/>
-            <a:lstStyle/>
-            <a:p>
-              <a:pPr algn="ctr"/>
-              <a:endParaRPr lang="en-US" dirty="0"/>
-            </a:p>
-          </p:txBody>
-        </p:sp>
-        <p:cxnSp>
-          <p:nvCxnSpPr>
-            <p:cNvPr id="11" name="Straight Connector 10">
-              <a:extLst>
-                <a:ext uri="{FF2B5EF4-FFF2-40B4-BE49-F238E27FC236}">
-                  <a16:creationId xmlns:a16="http://schemas.microsoft.com/office/drawing/2014/main" id="{29E1ABB4-B3C1-A641-1378-EC717DB3FFBA}"/>
-                </a:ext>
-              </a:extLst>
-            </p:cNvPr>
-            <p:cNvCxnSpPr/>
-            <p:nvPr/>
-          </p:nvCxnSpPr>
-          <p:spPr>
-            <a:xfrm>
-              <a:off x="4265249" y="4800600"/>
-              <a:ext cx="1827702" cy="0"/>
-            </a:xfrm>
-            <a:prstGeom prst="line">
-              <a:avLst/>
-            </a:prstGeom>
-            <a:ln w="6350">
-              <a:solidFill>
-                <a:schemeClr val="tx1"/>
-              </a:solidFill>
-              <a:prstDash val="dash"/>
-            </a:ln>
-          </p:spPr>
-          <p:style>
-            <a:lnRef idx="1">
-              <a:schemeClr val="accent1"/>
-            </a:lnRef>
-            <a:fillRef idx="0">
-              <a:schemeClr val="accent1"/>
-            </a:fillRef>
-            <a:effectRef idx="0">
-              <a:schemeClr val="accent1"/>
-            </a:effectRef>
-            <a:fontRef idx="minor">
-              <a:schemeClr val="tx1"/>
-            </a:fontRef>
-          </p:style>
-        </p:cxnSp>
-        <p:cxnSp>
-          <p:nvCxnSpPr>
-            <p:cNvPr id="14" name="Straight Connector 13">
-              <a:extLst>
-                <a:ext uri="{FF2B5EF4-FFF2-40B4-BE49-F238E27FC236}">
-                  <a16:creationId xmlns:a16="http://schemas.microsoft.com/office/drawing/2014/main" id="{48A25567-7FFF-D0C6-C046-BFF05E416F85}"/>
-                </a:ext>
-              </a:extLst>
-            </p:cNvPr>
-            <p:cNvCxnSpPr>
-              <a:cxnSpLocks/>
-            </p:cNvCxnSpPr>
-            <p:nvPr/>
-          </p:nvCxnSpPr>
-          <p:spPr>
-            <a:xfrm>
-              <a:off x="5179100" y="4340174"/>
-              <a:ext cx="0" cy="920851"/>
-            </a:xfrm>
-            <a:prstGeom prst="line">
-              <a:avLst/>
-            </a:prstGeom>
-            <a:ln w="6350">
-              <a:solidFill>
-                <a:schemeClr val="tx1"/>
-              </a:solidFill>
-              <a:prstDash val="dash"/>
-            </a:ln>
-          </p:spPr>
-          <p:style>
-            <a:lnRef idx="1">
-              <a:schemeClr val="accent1"/>
-            </a:lnRef>
-            <a:fillRef idx="0">
-              <a:schemeClr val="accent1"/>
-            </a:fillRef>
-            <a:effectRef idx="0">
-              <a:schemeClr val="accent1"/>
-            </a:effectRef>
-            <a:fontRef idx="minor">
-              <a:schemeClr val="tx1"/>
-            </a:fontRef>
-          </p:style>
-        </p:cxnSp>
-        <p:cxnSp>
-          <p:nvCxnSpPr>
-            <p:cNvPr id="17" name="Straight Connector 16">
-              <a:extLst>
-                <a:ext uri="{FF2B5EF4-FFF2-40B4-BE49-F238E27FC236}">
-                  <a16:creationId xmlns:a16="http://schemas.microsoft.com/office/drawing/2014/main" id="{28E82D39-F69F-9F68-F207-5A929F2ABBC7}"/>
-                </a:ext>
-              </a:extLst>
-            </p:cNvPr>
-            <p:cNvCxnSpPr>
-              <a:cxnSpLocks/>
-            </p:cNvCxnSpPr>
-            <p:nvPr/>
-          </p:nvCxnSpPr>
-          <p:spPr>
-            <a:xfrm>
-              <a:off x="4724400" y="4343400"/>
-              <a:ext cx="0" cy="920851"/>
-            </a:xfrm>
-            <a:prstGeom prst="line">
-              <a:avLst/>
-            </a:prstGeom>
-            <a:ln w="6350">
-              <a:solidFill>
-                <a:schemeClr val="tx1"/>
-              </a:solidFill>
-              <a:prstDash val="dash"/>
-            </a:ln>
-          </p:spPr>
-          <p:style>
-            <a:lnRef idx="1">
-              <a:schemeClr val="accent1"/>
-            </a:lnRef>
-            <a:fillRef idx="0">
-              <a:schemeClr val="accent1"/>
-            </a:fillRef>
-            <a:effectRef idx="0">
-              <a:schemeClr val="accent1"/>
-            </a:effectRef>
-            <a:fontRef idx="minor">
-              <a:schemeClr val="tx1"/>
-            </a:fontRef>
-          </p:style>
-        </p:cxnSp>
-        <p:cxnSp>
-          <p:nvCxnSpPr>
-            <p:cNvPr id="18" name="Straight Connector 17">
-              <a:extLst>
-                <a:ext uri="{FF2B5EF4-FFF2-40B4-BE49-F238E27FC236}">
-                  <a16:creationId xmlns:a16="http://schemas.microsoft.com/office/drawing/2014/main" id="{628D8253-FA9F-1349-EBBA-71EB4A7DE8E4}"/>
-                </a:ext>
-              </a:extLst>
-            </p:cNvPr>
-            <p:cNvCxnSpPr>
-              <a:cxnSpLocks/>
-            </p:cNvCxnSpPr>
-            <p:nvPr/>
-          </p:nvCxnSpPr>
-          <p:spPr>
-            <a:xfrm>
-              <a:off x="5638800" y="3429000"/>
-              <a:ext cx="0" cy="1832024"/>
-            </a:xfrm>
-            <a:prstGeom prst="line">
-              <a:avLst/>
-            </a:prstGeom>
-            <a:ln w="6350">
-              <a:solidFill>
-                <a:schemeClr val="tx1"/>
-              </a:solidFill>
-              <a:prstDash val="dash"/>
-            </a:ln>
-          </p:spPr>
-          <p:style>
-            <a:lnRef idx="1">
-              <a:schemeClr val="accent1"/>
-            </a:lnRef>
-            <a:fillRef idx="0">
-              <a:schemeClr val="accent1"/>
-            </a:fillRef>
-            <a:effectRef idx="0">
-              <a:schemeClr val="accent1"/>
-            </a:effectRef>
-            <a:fontRef idx="minor">
-              <a:schemeClr val="tx1"/>
-            </a:fontRef>
-          </p:style>
-        </p:cxnSp>
-        <p:cxnSp>
-          <p:nvCxnSpPr>
-            <p:cNvPr id="20" name="Straight Connector 19">
-              <a:extLst>
-                <a:ext uri="{FF2B5EF4-FFF2-40B4-BE49-F238E27FC236}">
-                  <a16:creationId xmlns:a16="http://schemas.microsoft.com/office/drawing/2014/main" id="{017EEDB5-CFCF-23A1-0C05-2C9F4DC831FE}"/>
-                </a:ext>
-              </a:extLst>
-            </p:cNvPr>
-            <p:cNvCxnSpPr>
-              <a:cxnSpLocks/>
-            </p:cNvCxnSpPr>
-            <p:nvPr/>
-          </p:nvCxnSpPr>
-          <p:spPr>
-            <a:xfrm>
-              <a:off x="5180899" y="4347470"/>
-              <a:ext cx="915802" cy="0"/>
-            </a:xfrm>
-            <a:prstGeom prst="line">
-              <a:avLst/>
-            </a:prstGeom>
-            <a:ln w="6350">
-              <a:solidFill>
-                <a:schemeClr val="tx1"/>
-              </a:solidFill>
-              <a:prstDash val="dash"/>
-            </a:ln>
-          </p:spPr>
-          <p:style>
-            <a:lnRef idx="1">
-              <a:schemeClr val="accent1"/>
-            </a:lnRef>
-            <a:fillRef idx="0">
-              <a:schemeClr val="accent1"/>
-            </a:fillRef>
-            <a:effectRef idx="0">
-              <a:schemeClr val="accent1"/>
-            </a:effectRef>
-            <a:fontRef idx="minor">
-              <a:schemeClr val="tx1"/>
-            </a:fontRef>
-          </p:style>
-        </p:cxnSp>
-        <p:cxnSp>
-          <p:nvCxnSpPr>
-            <p:cNvPr id="22" name="Straight Connector 21">
-              <a:extLst>
-                <a:ext uri="{FF2B5EF4-FFF2-40B4-BE49-F238E27FC236}">
-                  <a16:creationId xmlns:a16="http://schemas.microsoft.com/office/drawing/2014/main" id="{32FFBA0D-90D1-1527-58E5-15C151277900}"/>
-                </a:ext>
-              </a:extLst>
-            </p:cNvPr>
-            <p:cNvCxnSpPr>
-              <a:cxnSpLocks/>
-            </p:cNvCxnSpPr>
-            <p:nvPr/>
-          </p:nvCxnSpPr>
-          <p:spPr>
-            <a:xfrm>
-              <a:off x="5180899" y="3886200"/>
-              <a:ext cx="915802" cy="0"/>
-            </a:xfrm>
-            <a:prstGeom prst="line">
-              <a:avLst/>
-            </a:prstGeom>
-            <a:ln w="6350">
-              <a:solidFill>
-                <a:schemeClr val="tx1"/>
-              </a:solidFill>
-              <a:prstDash val="dash"/>
-            </a:ln>
-          </p:spPr>
-          <p:style>
-            <a:lnRef idx="1">
-              <a:schemeClr val="accent1"/>
-            </a:lnRef>
-            <a:fillRef idx="0">
-              <a:schemeClr val="accent1"/>
-            </a:fillRef>
-            <a:effectRef idx="0">
-              <a:schemeClr val="accent1"/>
-            </a:effectRef>
-            <a:fontRef idx="minor">
-              <a:schemeClr val="tx1"/>
-            </a:fontRef>
-          </p:style>
-        </p:cxnSp>
-      </p:grpSp>
-      <p:sp>
-        <p:nvSpPr>
-          <p:cNvPr id="24" name="TextBox 23">
-            <a:extLst>
-              <a:ext uri="{FF2B5EF4-FFF2-40B4-BE49-F238E27FC236}">
-                <a16:creationId xmlns:a16="http://schemas.microsoft.com/office/drawing/2014/main" id="{16485CC3-418F-7D63-4D30-5A28970115E0}"/>
-              </a:ext>
-            </a:extLst>
-          </p:cNvPr>
-          <p:cNvSpPr txBox="1"/>
-          <p:nvPr/>
-        </p:nvSpPr>
-        <p:spPr>
-          <a:xfrm>
-            <a:off x="1524000" y="4905830"/>
-            <a:ext cx="3048463" cy="369332"/>
-          </a:xfrm>
-          <a:prstGeom prst="rect">
-            <a:avLst/>
-          </a:prstGeom>
-          <a:noFill/>
-        </p:spPr>
-        <p:txBody>
-          <a:bodyPr wrap="none" rtlCol="0">
-            <a:spAutoFit/>
-          </a:bodyPr>
-          <a:lstStyle/>
-          <a:p>
-            <a:r>
-              <a:rPr lang="en-US" dirty="0"/>
-              <a:t>Hint: cut along the dashed lines.</a:t>
-            </a:r>
-          </a:p>
-        </p:txBody>
-      </p:sp>
-    </p:spTree>
-    <p:extLst>
-      <p:ext uri="{BB962C8B-B14F-4D97-AF65-F5344CB8AC3E}">
-        <p14:creationId xmlns:p14="http://schemas.microsoft.com/office/powerpoint/2010/main" val="1126428353"/>
-      </p:ext>
-    </p:extLst>
-  </p:cSld>
-  <p:clrMapOvr>
-    <a:masterClrMapping/>
-  </p:clrMapOvr>
-</p:sld>
-</file>
-
-<file path=ppt/slides/slide3.xml><?xml version="1.0" encoding="utf-8"?>
-<p:sld xmlns:a="http://schemas.openxmlformats.org/drawingml/2006/main" xmlns:r="http://schemas.openxmlformats.org/officeDocument/2006/relationships" xmlns:p="http://schemas.openxmlformats.org/presentationml/2006/main">
-  <p:cSld>
-    <p:spTree>
-      <p:nvGrpSpPr>
-        <p:cNvPr id="1" name=""/>
-        <p:cNvGrpSpPr/>
-        <p:nvPr/>
-      </p:nvGrpSpPr>
-      <p:grpSpPr>
-        <a:xfrm>
-          <a:off x="0" y="0"/>
-          <a:ext cx="0" cy="0"/>
-          <a:chOff x="0" y="0"/>
-          <a:chExt cx="0" cy="0"/>
-        </a:xfrm>
-      </p:grpSpPr>
-      <p:sp>
-        <p:nvSpPr>
-          <p:cNvPr id="2" name="Title 1">
-            <a:extLst>
-              <a:ext uri="{FF2B5EF4-FFF2-40B4-BE49-F238E27FC236}">
-                <a16:creationId xmlns:a16="http://schemas.microsoft.com/office/drawing/2014/main" id="{CA317722-9261-B16F-DF2C-8CF6D23E8851}"/>
-              </a:ext>
-            </a:extLst>
-          </p:cNvPr>
-          <p:cNvSpPr>
-            <a:spLocks noGrp="1"/>
-          </p:cNvSpPr>
-          <p:nvPr>
-            <p:ph type="ctrTitle"/>
-          </p:nvPr>
-        </p:nvSpPr>
-        <p:spPr/>
-        <p:txBody>
-          <a:bodyPr/>
-          <a:lstStyle/>
-          <a:p>
-            <a:r>
-              <a:rPr lang="en-US" dirty="0"/>
-              <a:t>Solution</a:t>
-            </a:r>
-          </a:p>
-        </p:txBody>
-      </p:sp>
-      <p:sp>
-        <p:nvSpPr>
-          <p:cNvPr id="3" name="Subtitle 2">
-            <a:extLst>
-              <a:ext uri="{FF2B5EF4-FFF2-40B4-BE49-F238E27FC236}">
-                <a16:creationId xmlns:a16="http://schemas.microsoft.com/office/drawing/2014/main" id="{043C9A1C-775D-C72F-DB2C-E4FD1E85D80F}"/>
-              </a:ext>
-            </a:extLst>
-          </p:cNvPr>
-          <p:cNvSpPr>
-            <a:spLocks noGrp="1"/>
-          </p:cNvSpPr>
-          <p:nvPr>
-            <p:ph type="subTitle" idx="1"/>
-          </p:nvPr>
-        </p:nvSpPr>
-        <p:spPr/>
-        <p:txBody>
-          <a:bodyPr/>
-          <a:lstStyle/>
-          <a:p>
-            <a:endParaRPr lang="en-US" dirty="0"/>
-          </a:p>
-        </p:txBody>
-      </p:sp>
-      <p:cxnSp>
-        <p:nvCxnSpPr>
-          <p:cNvPr id="4" name="Straight Connector 3">
-            <a:extLst>
-              <a:ext uri="{FF2B5EF4-FFF2-40B4-BE49-F238E27FC236}">
-                <a16:creationId xmlns:a16="http://schemas.microsoft.com/office/drawing/2014/main" id="{AA241FF2-783E-F0FB-BBB6-BDB4BE717A67}"/>
-              </a:ext>
-            </a:extLst>
-          </p:cNvPr>
-          <p:cNvCxnSpPr>
-            <a:cxnSpLocks/>
-          </p:cNvCxnSpPr>
-          <p:nvPr/>
-        </p:nvCxnSpPr>
-        <p:spPr>
-          <a:xfrm>
-            <a:off x="11580671" y="7607456"/>
-            <a:ext cx="1219200" cy="0"/>
-          </a:xfrm>
-          <a:prstGeom prst="line">
-            <a:avLst/>
-          </a:prstGeom>
-          <a:ln w="25400">
-            <a:solidFill>
-              <a:schemeClr val="tx1"/>
-            </a:solidFill>
-          </a:ln>
-        </p:spPr>
-        <p:style>
-          <a:lnRef idx="1">
-            <a:schemeClr val="accent1"/>
-          </a:lnRef>
-          <a:fillRef idx="0">
-            <a:schemeClr val="accent1"/>
-          </a:fillRef>
-          <a:effectRef idx="0">
-            <a:schemeClr val="accent1"/>
-          </a:effectRef>
-          <a:fontRef idx="minor">
-            <a:schemeClr val="tx1"/>
-          </a:fontRef>
-        </p:style>
-      </p:cxnSp>
-    </p:spTree>
-    <p:extLst>
-      <p:ext uri="{BB962C8B-B14F-4D97-AF65-F5344CB8AC3E}">
-        <p14:creationId xmlns:p14="http://schemas.microsoft.com/office/powerpoint/2010/main" val="3901014800"/>
-      </p:ext>
-    </p:extLst>
-  </p:cSld>
-  <p:clrMapOvr>
-    <a:masterClrMapping/>
-  </p:clrMapOvr>
-</p:sld>
-</file>
-
-<file path=ppt/slides/slide4.xml><?xml version="1.0" encoding="utf-8"?>
-<p:sld xmlns:a="http://schemas.openxmlformats.org/drawingml/2006/main" xmlns:r="http://schemas.openxmlformats.org/officeDocument/2006/relationships" xmlns:p="http://schemas.openxmlformats.org/presentationml/2006/main">
-  <p:cSld>
-    <p:spTree>
-      <p:nvGrpSpPr>
-        <p:cNvPr id="1" name=""/>
-        <p:cNvGrpSpPr/>
-        <p:nvPr/>
-      </p:nvGrpSpPr>
-      <p:grpSpPr>
-        <a:xfrm>
-          <a:off x="0" y="0"/>
-          <a:ext cx="0" cy="0"/>
-          <a:chOff x="0" y="0"/>
-          <a:chExt cx="0" cy="0"/>
-        </a:xfrm>
-      </p:grpSpPr>
-      <p:sp>
-        <p:nvSpPr>
-          <p:cNvPr id="2" name="Title 1">
-            <a:extLst>
-              <a:ext uri="{FF2B5EF4-FFF2-40B4-BE49-F238E27FC236}">
-                <a16:creationId xmlns:a16="http://schemas.microsoft.com/office/drawing/2014/main" id="{56226C64-365C-4FF3-44C1-F1E828C19684}"/>
-              </a:ext>
-            </a:extLst>
-          </p:cNvPr>
-          <p:cNvSpPr>
-            <a:spLocks noGrp="1"/>
-          </p:cNvSpPr>
-          <p:nvPr>
-            <p:ph type="title"/>
-          </p:nvPr>
-        </p:nvSpPr>
-        <p:spPr/>
-        <p:txBody>
-          <a:bodyPr/>
-          <a:lstStyle/>
-          <a:p>
-            <a:endParaRPr lang="en-US" dirty="0"/>
-          </a:p>
-        </p:txBody>
-      </p:sp>
-      <p:sp>
-        <p:nvSpPr>
-          <p:cNvPr id="3" name="Content Placeholder 2">
-            <a:extLst>
-              <a:ext uri="{FF2B5EF4-FFF2-40B4-BE49-F238E27FC236}">
-                <a16:creationId xmlns:a16="http://schemas.microsoft.com/office/drawing/2014/main" id="{F4F551EF-C73D-5C85-984A-ACA511573A8C}"/>
-              </a:ext>
-            </a:extLst>
-          </p:cNvPr>
-          <p:cNvSpPr>
-            <a:spLocks noGrp="1"/>
-          </p:cNvSpPr>
-          <p:nvPr>
-            <p:ph idx="1"/>
-          </p:nvPr>
-        </p:nvSpPr>
-        <p:spPr>
-          <a:xfrm>
-            <a:off x="1295402" y="5257800"/>
-            <a:ext cx="9601196" cy="846668"/>
-          </a:xfrm>
-        </p:spPr>
-        <p:txBody>
-          <a:bodyPr>
-            <a:normAutofit lnSpcReduction="10000"/>
-          </a:bodyPr>
-          <a:lstStyle/>
-          <a:p>
-            <a:r>
-              <a:rPr lang="en-US" dirty="0"/>
-              <a:t>The problem was from this video: </a:t>
-            </a:r>
-            <a:r>
-              <a:rPr lang="en-US" dirty="0">
-                <a:hlinkClick r:id="rId2"/>
-              </a:rPr>
-              <a:t>https://www.youtube.com/shorts/hgp-BzhkF8Y</a:t>
-            </a:r>
-            <a:endParaRPr lang="en-US" dirty="0"/>
-          </a:p>
-          <a:p>
-            <a:endParaRPr lang="en-US" dirty="0"/>
-          </a:p>
-        </p:txBody>
-      </p:sp>
-      <p:grpSp>
-        <p:nvGrpSpPr>
-          <p:cNvPr id="4" name="Group 3">
-            <a:extLst>
-              <a:ext uri="{FF2B5EF4-FFF2-40B4-BE49-F238E27FC236}">
-                <a16:creationId xmlns:a16="http://schemas.microsoft.com/office/drawing/2014/main" id="{936A957C-E2E0-B5CE-FA1A-B799071933DD}"/>
-              </a:ext>
-            </a:extLst>
-          </p:cNvPr>
-          <p:cNvGrpSpPr/>
-          <p:nvPr/>
-        </p:nvGrpSpPr>
-        <p:grpSpPr>
-          <a:xfrm>
-            <a:off x="4264548" y="2590800"/>
+            <a:off x="4796662" y="3429000"/>
             <a:ext cx="1831452" cy="1841702"/>
             <a:chOff x="4265249" y="3426619"/>
             <a:chExt cx="1831452" cy="1841702"/>
@@ -7299,7 +6048,7 @@
             <p:cNvPr id="5" name="Freeform: Shape 4">
               <a:extLst>
                 <a:ext uri="{FF2B5EF4-FFF2-40B4-BE49-F238E27FC236}">
-                  <a16:creationId xmlns:a16="http://schemas.microsoft.com/office/drawing/2014/main" id="{E59058EF-9839-8400-D5FD-1C3547D7FD93}"/>
+                  <a16:creationId xmlns:a16="http://schemas.microsoft.com/office/drawing/2014/main" id="{E2F4F76C-4BB1-6981-AAED-325A273CE712}"/>
                 </a:ext>
               </a:extLst>
             </p:cNvPr>
@@ -8030,7 +6779,7 @@
             <p:cNvPr id="6" name="Straight Connector 5">
               <a:extLst>
                 <a:ext uri="{FF2B5EF4-FFF2-40B4-BE49-F238E27FC236}">
-                  <a16:creationId xmlns:a16="http://schemas.microsoft.com/office/drawing/2014/main" id="{BCF51F8A-140C-F873-8040-4B26951A1CAC}"/>
+                  <a16:creationId xmlns:a16="http://schemas.microsoft.com/office/drawing/2014/main" id="{8D2194C9-6BD6-7BA3-9502-805DFBB1423D}"/>
                 </a:ext>
               </a:extLst>
             </p:cNvPr>
@@ -8072,7 +6821,7 @@
             <p:cNvPr id="7" name="Straight Connector 6">
               <a:extLst>
                 <a:ext uri="{FF2B5EF4-FFF2-40B4-BE49-F238E27FC236}">
-                  <a16:creationId xmlns:a16="http://schemas.microsoft.com/office/drawing/2014/main" id="{4D83478E-D32F-2C26-AB35-8C55F268015C}"/>
+                  <a16:creationId xmlns:a16="http://schemas.microsoft.com/office/drawing/2014/main" id="{6B30AF22-1AB0-6C04-ADD5-006A63AAA6A8}"/>
                 </a:ext>
               </a:extLst>
             </p:cNvPr>
@@ -8116,7 +6865,7 @@
             <p:cNvPr id="8" name="Straight Connector 7">
               <a:extLst>
                 <a:ext uri="{FF2B5EF4-FFF2-40B4-BE49-F238E27FC236}">
-                  <a16:creationId xmlns:a16="http://schemas.microsoft.com/office/drawing/2014/main" id="{26798406-715B-9450-2B65-321C8EDB9F33}"/>
+                  <a16:creationId xmlns:a16="http://schemas.microsoft.com/office/drawing/2014/main" id="{22D2BEDC-1341-BB3F-3FF5-7EE15A22ABE9}"/>
                 </a:ext>
               </a:extLst>
             </p:cNvPr>
@@ -8160,7 +6909,7 @@
             <p:cNvPr id="9" name="Straight Connector 8">
               <a:extLst>
                 <a:ext uri="{FF2B5EF4-FFF2-40B4-BE49-F238E27FC236}">
-                  <a16:creationId xmlns:a16="http://schemas.microsoft.com/office/drawing/2014/main" id="{AA5E44A8-00D5-3880-37A7-628256449405}"/>
+                  <a16:creationId xmlns:a16="http://schemas.microsoft.com/office/drawing/2014/main" id="{81B816D8-87EC-23AD-A18F-299C261CF9AF}"/>
                 </a:ext>
               </a:extLst>
             </p:cNvPr>
@@ -8204,7 +6953,7 @@
             <p:cNvPr id="10" name="Straight Connector 9">
               <a:extLst>
                 <a:ext uri="{FF2B5EF4-FFF2-40B4-BE49-F238E27FC236}">
-                  <a16:creationId xmlns:a16="http://schemas.microsoft.com/office/drawing/2014/main" id="{330844A6-9B1A-15FD-5D9C-2845A9D84716}"/>
+                  <a16:creationId xmlns:a16="http://schemas.microsoft.com/office/drawing/2014/main" id="{F015F5E4-5792-7D16-0054-A52E6BCF31EC}"/>
                 </a:ext>
               </a:extLst>
             </p:cNvPr>
@@ -8248,7 +6997,7 @@
             <p:cNvPr id="11" name="Straight Connector 10">
               <a:extLst>
                 <a:ext uri="{FF2B5EF4-FFF2-40B4-BE49-F238E27FC236}">
-                  <a16:creationId xmlns:a16="http://schemas.microsoft.com/office/drawing/2014/main" id="{861C9CB4-E0A7-25BD-5CE0-6C9049B1DDF2}"/>
+                  <a16:creationId xmlns:a16="http://schemas.microsoft.com/office/drawing/2014/main" id="{65BC8851-5D5D-387F-A953-378E377ED834}"/>
                 </a:ext>
               </a:extLst>
             </p:cNvPr>
@@ -8290,467 +7039,43 @@
       </p:grpSp>
       <p:sp>
         <p:nvSpPr>
-          <p:cNvPr id="12" name="Rectangle 11">
+          <p:cNvPr id="12" name="TextBox 11">
             <a:extLst>
               <a:ext uri="{FF2B5EF4-FFF2-40B4-BE49-F238E27FC236}">
-                <a16:creationId xmlns:a16="http://schemas.microsoft.com/office/drawing/2014/main" id="{9C9954EC-5625-FB23-385F-91B575C19F37}"/>
+                <a16:creationId xmlns:a16="http://schemas.microsoft.com/office/drawing/2014/main" id="{16A158C6-C2A0-9780-01A4-8DCC4C98911A}"/>
               </a:ext>
             </a:extLst>
           </p:cNvPr>
-          <p:cNvSpPr/>
+          <p:cNvSpPr txBox="1"/>
           <p:nvPr/>
         </p:nvSpPr>
         <p:spPr>
           <a:xfrm>
-            <a:off x="4267200" y="3505200"/>
-            <a:ext cx="457200" cy="457200"/>
+            <a:off x="1447800" y="5506536"/>
+            <a:ext cx="3048463" cy="369332"/>
           </a:xfrm>
           <a:prstGeom prst="rect">
             <a:avLst/>
           </a:prstGeom>
-          <a:ln>
-            <a:noFill/>
-          </a:ln>
+          <a:noFill/>
         </p:spPr>
-        <p:style>
-          <a:lnRef idx="2">
-            <a:schemeClr val="accent1">
-              <a:shade val="50000"/>
-            </a:schemeClr>
-          </a:lnRef>
-          <a:fillRef idx="1">
-            <a:schemeClr val="accent1"/>
-          </a:fillRef>
-          <a:effectRef idx="0">
-            <a:schemeClr val="accent1"/>
-          </a:effectRef>
-          <a:fontRef idx="minor">
-            <a:schemeClr val="lt1"/>
-          </a:fontRef>
-        </p:style>
-        <p:txBody>
-          <a:bodyPr rtlCol="0" anchor="ctr"/>
+        <p:txBody>
+          <a:bodyPr wrap="none" rtlCol="0">
+            <a:spAutoFit/>
+          </a:bodyPr>
           <a:lstStyle/>
           <a:p>
-            <a:pPr algn="ctr"/>
-            <a:endParaRPr lang="en-US"/>
-          </a:p>
-        </p:txBody>
-      </p:sp>
-      <p:sp>
-        <p:nvSpPr>
-          <p:cNvPr id="13" name="Rectangle 12">
-            <a:extLst>
-              <a:ext uri="{FF2B5EF4-FFF2-40B4-BE49-F238E27FC236}">
-                <a16:creationId xmlns:a16="http://schemas.microsoft.com/office/drawing/2014/main" id="{0BBD8908-3C3D-3282-7BB6-6B21EA5E0986}"/>
-              </a:ext>
-            </a:extLst>
-          </p:cNvPr>
-          <p:cNvSpPr/>
-          <p:nvPr/>
-        </p:nvSpPr>
-        <p:spPr>
-          <a:xfrm>
-            <a:off x="4267200" y="3962400"/>
-            <a:ext cx="457200" cy="457200"/>
-          </a:xfrm>
-          <a:prstGeom prst="rect">
-            <a:avLst/>
-          </a:prstGeom>
-          <a:ln>
-            <a:noFill/>
-          </a:ln>
-        </p:spPr>
-        <p:style>
-          <a:lnRef idx="2">
-            <a:schemeClr val="accent1">
-              <a:shade val="50000"/>
-            </a:schemeClr>
-          </a:lnRef>
-          <a:fillRef idx="1">
-            <a:schemeClr val="accent1"/>
-          </a:fillRef>
-          <a:effectRef idx="0">
-            <a:schemeClr val="accent1"/>
-          </a:effectRef>
-          <a:fontRef idx="minor">
-            <a:schemeClr val="lt1"/>
-          </a:fontRef>
-        </p:style>
-        <p:txBody>
-          <a:bodyPr rtlCol="0" anchor="ctr"/>
-          <a:lstStyle/>
-          <a:p>
-            <a:pPr algn="ctr"/>
-            <a:endParaRPr lang="en-US"/>
-          </a:p>
-        </p:txBody>
-      </p:sp>
-      <p:sp>
-        <p:nvSpPr>
-          <p:cNvPr id="14" name="Rectangle 13">
-            <a:extLst>
-              <a:ext uri="{FF2B5EF4-FFF2-40B4-BE49-F238E27FC236}">
-                <a16:creationId xmlns:a16="http://schemas.microsoft.com/office/drawing/2014/main" id="{38C4FD29-F2C3-0AE1-2A7D-B0E5F102CFD5}"/>
-              </a:ext>
-            </a:extLst>
-          </p:cNvPr>
-          <p:cNvSpPr/>
-          <p:nvPr/>
-        </p:nvSpPr>
-        <p:spPr>
-          <a:xfrm>
-            <a:off x="4727702" y="3958330"/>
-            <a:ext cx="457200" cy="457200"/>
-          </a:xfrm>
-          <a:prstGeom prst="rect">
-            <a:avLst/>
-          </a:prstGeom>
-          <a:ln>
-            <a:noFill/>
-          </a:ln>
-        </p:spPr>
-        <p:style>
-          <a:lnRef idx="2">
-            <a:schemeClr val="accent1">
-              <a:shade val="50000"/>
-            </a:schemeClr>
-          </a:lnRef>
-          <a:fillRef idx="1">
-            <a:schemeClr val="accent1"/>
-          </a:fillRef>
-          <a:effectRef idx="0">
-            <a:schemeClr val="accent1"/>
-          </a:effectRef>
-          <a:fontRef idx="minor">
-            <a:schemeClr val="lt1"/>
-          </a:fontRef>
-        </p:style>
-        <p:txBody>
-          <a:bodyPr rtlCol="0" anchor="ctr"/>
-          <a:lstStyle/>
-          <a:p>
-            <a:pPr algn="ctr"/>
-            <a:endParaRPr lang="en-US"/>
-          </a:p>
-        </p:txBody>
-      </p:sp>
-      <p:sp>
-        <p:nvSpPr>
-          <p:cNvPr id="15" name="Rectangle 14">
-            <a:extLst>
-              <a:ext uri="{FF2B5EF4-FFF2-40B4-BE49-F238E27FC236}">
-                <a16:creationId xmlns:a16="http://schemas.microsoft.com/office/drawing/2014/main" id="{A9D1C5AB-C2DC-EEA0-F240-55A80010A650}"/>
-              </a:ext>
-            </a:extLst>
-          </p:cNvPr>
-          <p:cNvSpPr/>
-          <p:nvPr/>
-        </p:nvSpPr>
-        <p:spPr>
-          <a:xfrm>
-            <a:off x="5180899" y="2594372"/>
-            <a:ext cx="457200" cy="457200"/>
-          </a:xfrm>
-          <a:prstGeom prst="rect">
-            <a:avLst/>
-          </a:prstGeom>
-          <a:solidFill>
-            <a:schemeClr val="accent3"/>
-          </a:solidFill>
-          <a:ln>
-            <a:noFill/>
-          </a:ln>
-        </p:spPr>
-        <p:style>
-          <a:lnRef idx="2">
-            <a:schemeClr val="accent1">
-              <a:shade val="50000"/>
-            </a:schemeClr>
-          </a:lnRef>
-          <a:fillRef idx="1">
-            <a:schemeClr val="accent1"/>
-          </a:fillRef>
-          <a:effectRef idx="0">
-            <a:schemeClr val="accent1"/>
-          </a:effectRef>
-          <a:fontRef idx="minor">
-            <a:schemeClr val="lt1"/>
-          </a:fontRef>
-        </p:style>
-        <p:txBody>
-          <a:bodyPr rtlCol="0" anchor="ctr"/>
-          <a:lstStyle/>
-          <a:p>
-            <a:pPr algn="ctr"/>
-            <a:endParaRPr lang="en-US"/>
-          </a:p>
-        </p:txBody>
-      </p:sp>
-      <p:sp>
-        <p:nvSpPr>
-          <p:cNvPr id="16" name="Rectangle 15">
-            <a:extLst>
-              <a:ext uri="{FF2B5EF4-FFF2-40B4-BE49-F238E27FC236}">
-                <a16:creationId xmlns:a16="http://schemas.microsoft.com/office/drawing/2014/main" id="{8D2EA3C7-FE44-5BF2-1A4F-DEC0EFB48B1A}"/>
-              </a:ext>
-            </a:extLst>
-          </p:cNvPr>
-          <p:cNvSpPr/>
-          <p:nvPr/>
-        </p:nvSpPr>
-        <p:spPr>
-          <a:xfrm>
-            <a:off x="5633450" y="2592337"/>
-            <a:ext cx="457200" cy="457200"/>
-          </a:xfrm>
-          <a:prstGeom prst="rect">
-            <a:avLst/>
-          </a:prstGeom>
-          <a:solidFill>
-            <a:schemeClr val="accent3"/>
-          </a:solidFill>
-          <a:ln>
-            <a:noFill/>
-          </a:ln>
-        </p:spPr>
-        <p:style>
-          <a:lnRef idx="2">
-            <a:schemeClr val="accent1">
-              <a:shade val="50000"/>
-            </a:schemeClr>
-          </a:lnRef>
-          <a:fillRef idx="1">
-            <a:schemeClr val="accent1"/>
-          </a:fillRef>
-          <a:effectRef idx="0">
-            <a:schemeClr val="accent1"/>
-          </a:effectRef>
-          <a:fontRef idx="minor">
-            <a:schemeClr val="lt1"/>
-          </a:fontRef>
-        </p:style>
-        <p:txBody>
-          <a:bodyPr rtlCol="0" anchor="ctr"/>
-          <a:lstStyle/>
-          <a:p>
-            <a:pPr algn="ctr"/>
-            <a:endParaRPr lang="en-US"/>
-          </a:p>
-        </p:txBody>
-      </p:sp>
-      <p:sp>
-        <p:nvSpPr>
-          <p:cNvPr id="17" name="Rectangle 16">
-            <a:extLst>
-              <a:ext uri="{FF2B5EF4-FFF2-40B4-BE49-F238E27FC236}">
-                <a16:creationId xmlns:a16="http://schemas.microsoft.com/office/drawing/2014/main" id="{BCC10072-BE0D-BD28-9215-35CDD0F7ED80}"/>
-              </a:ext>
-            </a:extLst>
-          </p:cNvPr>
-          <p:cNvSpPr/>
-          <p:nvPr/>
-        </p:nvSpPr>
-        <p:spPr>
-          <a:xfrm>
-            <a:off x="5633450" y="3054451"/>
-            <a:ext cx="457200" cy="457200"/>
-          </a:xfrm>
-          <a:prstGeom prst="rect">
-            <a:avLst/>
-          </a:prstGeom>
-          <a:solidFill>
-            <a:schemeClr val="accent3"/>
-          </a:solidFill>
-          <a:ln>
-            <a:noFill/>
-          </a:ln>
-        </p:spPr>
-        <p:style>
-          <a:lnRef idx="2">
-            <a:schemeClr val="accent1">
-              <a:shade val="50000"/>
-            </a:schemeClr>
-          </a:lnRef>
-          <a:fillRef idx="1">
-            <a:schemeClr val="accent1"/>
-          </a:fillRef>
-          <a:effectRef idx="0">
-            <a:schemeClr val="accent1"/>
-          </a:effectRef>
-          <a:fontRef idx="minor">
-            <a:schemeClr val="lt1"/>
-          </a:fontRef>
-        </p:style>
-        <p:txBody>
-          <a:bodyPr rtlCol="0" anchor="ctr"/>
-          <a:lstStyle/>
-          <a:p>
-            <a:pPr algn="ctr"/>
-            <a:endParaRPr lang="en-US"/>
-          </a:p>
-        </p:txBody>
-      </p:sp>
-      <p:sp>
-        <p:nvSpPr>
-          <p:cNvPr id="18" name="Rectangle 17">
-            <a:extLst>
-              <a:ext uri="{FF2B5EF4-FFF2-40B4-BE49-F238E27FC236}">
-                <a16:creationId xmlns:a16="http://schemas.microsoft.com/office/drawing/2014/main" id="{C06CF29B-CF4B-243E-3623-CE808191A035}"/>
-              </a:ext>
-            </a:extLst>
-          </p:cNvPr>
-          <p:cNvSpPr/>
-          <p:nvPr/>
-        </p:nvSpPr>
-        <p:spPr>
-          <a:xfrm>
-            <a:off x="5629097" y="3514033"/>
-            <a:ext cx="457200" cy="457200"/>
-          </a:xfrm>
-          <a:prstGeom prst="rect">
-            <a:avLst/>
-          </a:prstGeom>
-          <a:solidFill>
-            <a:schemeClr val="accent4"/>
-          </a:solidFill>
-          <a:ln>
-            <a:noFill/>
-          </a:ln>
-        </p:spPr>
-        <p:style>
-          <a:lnRef idx="2">
-            <a:schemeClr val="accent1">
-              <a:shade val="50000"/>
-            </a:schemeClr>
-          </a:lnRef>
-          <a:fillRef idx="1">
-            <a:schemeClr val="accent1"/>
-          </a:fillRef>
-          <a:effectRef idx="0">
-            <a:schemeClr val="accent1"/>
-          </a:effectRef>
-          <a:fontRef idx="minor">
-            <a:schemeClr val="lt1"/>
-          </a:fontRef>
-        </p:style>
-        <p:txBody>
-          <a:bodyPr rtlCol="0" anchor="ctr"/>
-          <a:lstStyle/>
-          <a:p>
-            <a:pPr algn="ctr"/>
-            <a:endParaRPr lang="en-US"/>
-          </a:p>
-        </p:txBody>
-      </p:sp>
-      <p:sp>
-        <p:nvSpPr>
-          <p:cNvPr id="19" name="Rectangle 18">
-            <a:extLst>
-              <a:ext uri="{FF2B5EF4-FFF2-40B4-BE49-F238E27FC236}">
-                <a16:creationId xmlns:a16="http://schemas.microsoft.com/office/drawing/2014/main" id="{DE5B7379-9133-B538-37D7-BDA98A8378B9}"/>
-              </a:ext>
-            </a:extLst>
-          </p:cNvPr>
-          <p:cNvSpPr/>
-          <p:nvPr/>
-        </p:nvSpPr>
-        <p:spPr>
-          <a:xfrm>
-            <a:off x="5191099" y="3964781"/>
-            <a:ext cx="457200" cy="457200"/>
-          </a:xfrm>
-          <a:prstGeom prst="rect">
-            <a:avLst/>
-          </a:prstGeom>
-          <a:solidFill>
-            <a:schemeClr val="accent4"/>
-          </a:solidFill>
-          <a:ln>
-            <a:noFill/>
-          </a:ln>
-        </p:spPr>
-        <p:style>
-          <a:lnRef idx="2">
-            <a:schemeClr val="accent1">
-              <a:shade val="50000"/>
-            </a:schemeClr>
-          </a:lnRef>
-          <a:fillRef idx="1">
-            <a:schemeClr val="accent1"/>
-          </a:fillRef>
-          <a:effectRef idx="0">
-            <a:schemeClr val="accent1"/>
-          </a:effectRef>
-          <a:fontRef idx="minor">
-            <a:schemeClr val="lt1"/>
-          </a:fontRef>
-        </p:style>
-        <p:txBody>
-          <a:bodyPr rtlCol="0" anchor="ctr"/>
-          <a:lstStyle/>
-          <a:p>
-            <a:pPr algn="ctr"/>
-            <a:endParaRPr lang="en-US"/>
-          </a:p>
-        </p:txBody>
-      </p:sp>
-      <p:sp>
-        <p:nvSpPr>
-          <p:cNvPr id="20" name="Rectangle 19">
-            <a:extLst>
-              <a:ext uri="{FF2B5EF4-FFF2-40B4-BE49-F238E27FC236}">
-                <a16:creationId xmlns:a16="http://schemas.microsoft.com/office/drawing/2014/main" id="{8D1E1980-12EE-2F21-8C60-F10F80005904}"/>
-              </a:ext>
-            </a:extLst>
-          </p:cNvPr>
-          <p:cNvSpPr/>
-          <p:nvPr/>
-        </p:nvSpPr>
-        <p:spPr>
-          <a:xfrm>
-            <a:off x="5629097" y="3958330"/>
-            <a:ext cx="457200" cy="457200"/>
-          </a:xfrm>
-          <a:prstGeom prst="rect">
-            <a:avLst/>
-          </a:prstGeom>
-          <a:solidFill>
-            <a:schemeClr val="accent4"/>
-          </a:solidFill>
-          <a:ln>
-            <a:noFill/>
-          </a:ln>
-        </p:spPr>
-        <p:style>
-          <a:lnRef idx="2">
-            <a:schemeClr val="accent1">
-              <a:shade val="50000"/>
-            </a:schemeClr>
-          </a:lnRef>
-          <a:fillRef idx="1">
-            <a:schemeClr val="accent1"/>
-          </a:fillRef>
-          <a:effectRef idx="0">
-            <a:schemeClr val="accent1"/>
-          </a:effectRef>
-          <a:fontRef idx="minor">
-            <a:schemeClr val="lt1"/>
-          </a:fontRef>
-        </p:style>
-        <p:txBody>
-          <a:bodyPr rtlCol="0" anchor="ctr"/>
-          <a:lstStyle/>
-          <a:p>
-            <a:pPr algn="ctr"/>
-            <a:endParaRPr lang="en-US"/>
+            <a:r>
+              <a:rPr lang="en-US" dirty="0"/>
+              <a:t>Hint: cut along the dashed lines.</a:t>
+            </a:r>
           </a:p>
         </p:txBody>
       </p:sp>
     </p:spTree>
     <p:extLst>
       <p:ext uri="{BB962C8B-B14F-4D97-AF65-F5344CB8AC3E}">
-        <p14:creationId xmlns:p14="http://schemas.microsoft.com/office/powerpoint/2010/main" val="4269573930"/>
+        <p14:creationId xmlns:p14="http://schemas.microsoft.com/office/powerpoint/2010/main" val="3752263150"/>
       </p:ext>
     </p:extLst>
   </p:cSld>

</xml_diff>